<commit_message>
update image size to 28x28
</commit_message>
<xml_diff>
--- a/gallery/images.pptx
+++ b/gallery/images.pptx
@@ -8,6 +8,9 @@
     <p:sldId id="256" r:id="rId2"/>
     <p:sldId id="257" r:id="rId3"/>
     <p:sldId id="258" r:id="rId4"/>
+    <p:sldId id="259" r:id="rId5"/>
+    <p:sldId id="261" r:id="rId6"/>
+    <p:sldId id="260" r:id="rId7"/>
   </p:sldIdLst>
   <p:sldSz cx="12192000" cy="6858000"/>
   <p:notesSz cx="6858000" cy="9144000"/>
@@ -106,7 +109,336 @@
       </a:defRPr>
     </a:lvl9pPr>
   </p:defaultTextStyle>
+  <p:extLst>
+    <p:ext uri="{EFAFB233-063F-42B5-8137-9DF3F51BA10A}">
+      <p15:sldGuideLst xmlns:p15="http://schemas.microsoft.com/office/powerpoint/2012/main"/>
+    </p:ext>
+  </p:extLst>
 </p:presentation>
+</file>
+
+<file path=ppt/ink/ink1.xml><?xml version="1.0" encoding="utf-8"?>
+<inkml:ink xmlns:inkml="http://www.w3.org/2003/InkML">
+  <inkml:definitions>
+    <inkml:context xml:id="ctx0">
+      <inkml:inkSource xml:id="inkSrc0">
+        <inkml:traceFormat>
+          <inkml:channel name="X" type="integer" min="-2.14748E9" max="2.14748E9" units="cm"/>
+          <inkml:channel name="Y" type="integer" min="-2.14748E9" max="2.14748E9" units="cm"/>
+          <inkml:channel name="F" type="integer" max="32767" units="dev"/>
+        </inkml:traceFormat>
+        <inkml:channelProperties>
+          <inkml:channelProperty channel="X" name="resolution" value="1000" units="1/cm"/>
+          <inkml:channelProperty channel="Y" name="resolution" value="1000" units="1/cm"/>
+          <inkml:channelProperty channel="F" name="resolution" value="0" units="1/dev"/>
+        </inkml:channelProperties>
+      </inkml:inkSource>
+      <inkml:timestamp xml:id="ts0" timeString="2025-05-09T17:32:51.117"/>
+    </inkml:context>
+    <inkml:brush xml:id="br0">
+      <inkml:brushProperty name="width" value="0.35" units="cm"/>
+      <inkml:brushProperty name="height" value="0.35" units="cm"/>
+    </inkml:brush>
+  </inkml:definitions>
+  <inkml:trace contextRef="#ctx0" brushRef="#br0">249 901 24575,'3'-41'0,"1"1"0,2-1 0,16-56 0,-18 82 0,4-15 0,1 1 0,2 1 0,1 0 0,1 0 0,18-27 0,-5 16 0,1 1 0,52-57 0,-69 84 0,1 1 0,1 1 0,-1-1 0,2 2 0,-1-1 0,1 2 0,22-10 0,1 3 0,61-14 0,-40 12 0,71-25 0,-63 19 0,114-23 0,-18 28 0,-21 3 0,-20 2 0,179 6 0,-280 6 0,-6 0 0,0 1 0,0 1 0,0 0 0,-1 1 0,1 1 0,0-1 0,-1 2 0,0 0 0,0 0 0,0 1 0,-1 1 0,0 0 0,0 1 0,13 12 0,21 18 0,-3 2 0,-1 2 0,48 65 0,-75-89 0,-2 2 0,-1-1 0,0 2 0,-2-1 0,0 1 0,-1 1 0,-1 0 0,-1 0 0,5 37 0,-5 9 0,-4 129 0,-4-146 0,10 208 0,1-41 0,-10 1125 0,1-1334 0,0 0 0,0 1 0,0-1 0,1 0 0,0 1 0,5 14 0,-6-23 0,0 0 0,0 0 0,1 0 0,-1 0 0,0 0 0,1 0 0,-1 0 0,1-1 0,-1 1 0,1 0 0,-1 0 0,1 0 0,0-1 0,-1 1 0,1 0 0,0-1 0,0 1 0,-1-1 0,1 1 0,0-1 0,0 1 0,1 0 0,-1-1 0,0 0 0,0 0 0,0-1 0,-1 1 0,1 0 0,0 0 0,0-1 0,0 1 0,-1 0 0,1-1 0,0 1 0,0-1 0,-1 1 0,1-1 0,-1 1 0,1-1 0,0 0 0,-1 1 0,1-1 0,0 0 0,2-4 0,0 0 0,0 0 0,0 0 0,0-1 0,-1 1 0,2-8 0,3-22 0,-2-1 0,-2 0 0,-1 0 0,-4-54 0,1 37 0,0 11 0,1-17 0,-15-117 0,11 158 0,0 0 0,-1 0 0,0 0 0,-2 1 0,0 0 0,-1 0 0,0 0 0,-2 1 0,0 1 0,-19-24 0,0 8 0,-1 0 0,-1 2 0,-2 2 0,-1 1 0,-64-38 0,77 54 0,0 1 0,0 0 0,-1 2 0,0 1 0,0 0 0,0 2 0,-34-3 0,-164 6 0,112 4 0,-278-3 0,355 1 0,-1 2 0,-56 11 0,-62 25 0,-16 4 0,138-36 0,1 0 0,0 3 0,0 0 0,1 1 0,-40 24 0,-117 88 0,94-60 0,61-44 0,-93 70 0,111-78 0,0-1 0,0 1 0,1 1 0,1-1 0,0 2 0,1-1 0,0 1 0,1 0 0,-8 24 0,0 10 0,-12 72 0,26-116 0,-11 83 0,4 0 0,6 139 0,2-121 0,-1-85 0,1 1 0,1-1 0,0 0 0,6 23 0,-4-32 0,-1 1 0,2-1 0,-1 0 0,1 0 0,1 0 0,-1-1 0,2 0 0,-1 0 0,9 8 0,3 1 0,1-1 0,1 0 0,0-1 0,1-2 0,0 0 0,2-1 0,-1-1 0,42 15 0,14-1 0,113 22 0,-43-12 0,-83-19 0,185 44 0,-164-46 0,287 62 0,-321-64 0,2-2 0,-1-3 0,1-2 0,0-2 0,1-3 0,57-6 0,-94 2 0,1 0 0,-1-1 0,0-1 0,0-1 0,0-1 0,-1 0 0,25-15 0,108-77 0,-147 96 0,33-22 0,-2-3 0,0-1 0,-2-1 0,-1-2 0,35-48 0,-59 70 0,-2 0 0,1 0 0,-1 0 0,-1-1 0,0 0 0,5-17 0,7-71 0,-10 56 0,3-31-682,0-76-1</inkml:trace>
+</inkml:ink>
+</file>
+
+<file path=ppt/ink/ink10.xml><?xml version="1.0" encoding="utf-8"?>
+<inkml:ink xmlns:inkml="http://www.w3.org/2003/InkML">
+  <inkml:definitions>
+    <inkml:context xml:id="ctx0">
+      <inkml:inkSource xml:id="inkSrc0">
+        <inkml:traceFormat>
+          <inkml:channel name="X" type="integer" min="-2.14748E9" max="2.14748E9" units="cm"/>
+          <inkml:channel name="Y" type="integer" min="-2.14748E9" max="2.14748E9" units="cm"/>
+          <inkml:channel name="F" type="integer" max="32767" units="dev"/>
+        </inkml:traceFormat>
+        <inkml:channelProperties>
+          <inkml:channelProperty channel="X" name="resolution" value="1000" units="1/cm"/>
+          <inkml:channelProperty channel="Y" name="resolution" value="1000" units="1/cm"/>
+          <inkml:channelProperty channel="F" name="resolution" value="0" units="1/dev"/>
+        </inkml:channelProperties>
+      </inkml:inkSource>
+      <inkml:timestamp xml:id="ts0" timeString="2025-05-09T17:35:06.645"/>
+    </inkml:context>
+    <inkml:brush xml:id="br0">
+      <inkml:brushProperty name="width" value="0.35" units="cm"/>
+      <inkml:brushProperty name="height" value="0.35" units="cm"/>
+    </inkml:brush>
+  </inkml:definitions>
+  <inkml:trace contextRef="#ctx0" brushRef="#br0">2439 1 24575,'-32'2'0,"1"1"0,-1 2 0,1 2 0,0 0 0,-39 16 0,-20 5 0,-45 5 0,-115 37 0,110-27 0,90-29 0,0 1 0,1 3 0,-53 28 0,-5 10 0,-68 39 0,129-67 0,-72 58 0,-177 195 0,213-198 0,29-25 0,3 2 0,-72 110 0,107-146 0,2 2 0,0 0 0,2 0 0,-12 38 0,-21 115 0,27-106 0,-10 71 0,-11 42 0,15-111 0,-24 93 0,39-129 0,1 1 0,-3 54 0,8-39 0,2-1 0,13 90 0,-9-118 0,2 0 0,1-1 0,1 0 0,0 0 0,2-1 0,1 0 0,24 37 0,-1-15 0,1-2 0,56 53 0,-54-59 0,-27-26 0,2-1 0,-1 0 0,2-1 0,-1 0 0,1-1 0,1 0 0,0-1 0,0-1 0,0 0 0,19 5 0,25 3 0,83 10 0,-69-14 0,12 0 0,87 1 0,84-11 0,-204-1 0,-14-1 0,-1-2 0,63-14 0,67-27 0,-87 19 0,-18 6 0,99-19 0,-107 29 0,0-2 0,-1-2 0,-1-3 0,75-33 0,-94 34 0,-2-2 0,1-1 0,-2-1 0,0-1 0,-2-2 0,0-1 0,43-48 0,-29 20 0,56-94 0,17-63 0,-100 180 0,-1-1 0,-1 0 0,-2-1 0,-1-1 0,-1 0 0,-1 0 0,-2 0 0,2-45 0,-11-226 0,0 84 0,5 36 0,-3-186 0,0 317 0,-3 1 0,-14-66 0,12 86 0,-2-1 0,-1 1 0,-2 0 0,-29-54 0,-48-77 224,37 63-1019,-119-169 1,124 209-6032</inkml:trace>
+</inkml:ink>
+</file>
+
+<file path=ppt/ink/ink11.xml><?xml version="1.0" encoding="utf-8"?>
+<inkml:ink xmlns:inkml="http://www.w3.org/2003/InkML">
+  <inkml:definitions>
+    <inkml:context xml:id="ctx0">
+      <inkml:inkSource xml:id="inkSrc0">
+        <inkml:traceFormat>
+          <inkml:channel name="X" type="integer" min="-2.14748E9" max="2.14748E9" units="cm"/>
+          <inkml:channel name="Y" type="integer" min="-2.14748E9" max="2.14748E9" units="cm"/>
+          <inkml:channel name="F" type="integer" max="32767" units="dev"/>
+        </inkml:traceFormat>
+        <inkml:channelProperties>
+          <inkml:channelProperty channel="X" name="resolution" value="1000" units="1/cm"/>
+          <inkml:channelProperty channel="Y" name="resolution" value="1000" units="1/cm"/>
+          <inkml:channelProperty channel="F" name="resolution" value="0" units="1/dev"/>
+        </inkml:channelProperties>
+      </inkml:inkSource>
+      <inkml:timestamp xml:id="ts0" timeString="2025-05-09T17:35:10.907"/>
+    </inkml:context>
+    <inkml:brush xml:id="br0">
+      <inkml:brushProperty name="width" value="0.35" units="cm"/>
+      <inkml:brushProperty name="height" value="0.35" units="cm"/>
+    </inkml:brush>
+  </inkml:definitions>
+  <inkml:trace contextRef="#ctx0" brushRef="#br0">1702 1 24575,'-532'0'0,"494"1"0,0 2 0,-56 11 0,-74 27 0,125-29 0,-13 3 0,0 3 0,2 3 0,0 2 0,1 2 0,2 2 0,-52 37 0,72-41 0,0 0 0,1 2 0,2 2 0,1 0 0,1 2 0,1 1 0,1 1 0,2 1 0,2 0 0,-19 41 0,27-45 0,2 0 0,1 2 0,1-1 0,2 1 0,1 0 0,-2 54 0,6 3 0,12 93 0,-10-167 0,0-1 0,1 0 0,1 0 0,0 0 0,1 0 0,9 21 0,-9-26 0,1 0 0,-1 0 0,1 0 0,0-1 0,1 1 0,-1-1 0,1 0 0,1-1 0,-1 0 0,1 0 0,8 5 0,-1-2 0,1-1 0,0-1 0,1 0 0,-1-1 0,1-1 0,0 0 0,0-1 0,0-1 0,1 0 0,-1-1 0,1-1 0,-1-1 0,22-3 0,18-6 0,-1-2 0,81-30 0,-68 20 0,-9 5 0,84-14 0,-112 26 0,1 2 0,-1 1 0,1 1 0,49 6 0,-70-3 0,-1 0 0,0 0 0,0 1 0,-1 0 0,1 0 0,-1 2 0,1-1 0,-1 1 0,0 0 0,-1 1 0,16 12 0,-16-10 0,1 1 0,-1 0 0,-1 1 0,0 0 0,0 0 0,-1 1 0,0-1 0,-1 1 0,8 21 0,-3 10 0,-1 0 0,-2 0 0,-2 0 0,0 55 0,-3-61 0,3 533 0,-7-317 0,4-185 0,0-35 0,-2-1 0,-1 1 0,-1-1 0,-10 50 0,10-72 0,-1 0 0,-1 0 0,1 0 0,-2-1 0,1 1 0,-1-1 0,0 0 0,-1 0 0,0-1 0,0 0 0,0 0 0,-1 0 0,0-1 0,0 0 0,-1 0 0,0 0 0,0-1 0,0-1 0,-1 1 0,-16 5 0,-35 8 0,-2-2 0,-94 12 0,120-25 0,0 0 0,0-2 0,-1-2 0,1-2 0,-69-13 0,91 12 0,0-1 0,1 0 0,-1-1 0,1-1 0,1 0 0,-1-1 0,1 0 0,0 0 0,1-2 0,0 1 0,1-1 0,0-1 0,0 0 0,1 0 0,0-1 0,1 0 0,1-1 0,0 0 0,-7-18 0,-5-15 0,-40-83 0,25 67 0,-42-109 0,64 138 0,2-1 0,1-1 0,2 0 0,1 0 0,-2-44 0,9-263 0,2 157 0,-3 168 0,1 1 0,1-1 0,1 0 0,0 0 0,1 1 0,0-1 0,2 1 0,11-24 0,-3 14 0,1 1 0,1 1 0,2 0 0,24-25 0,176-162 0,-194 189 0,1 0 0,0 1 0,1 1 0,1 1 0,0 2 0,2 1 0,0 1 0,38-14 0,-21 14 0,-1-1 0,66-36 0,-40 15 0,117-45 0,-55 28 0,-109 42 0,0-1 0,0-1 0,29-24 0,2-7-341,-3-2 0,-2-2-1,63-81 1</inkml:trace>
+</inkml:ink>
+</file>
+
+<file path=ppt/ink/ink12.xml><?xml version="1.0" encoding="utf-8"?>
+<inkml:ink xmlns:inkml="http://www.w3.org/2003/InkML">
+  <inkml:definitions>
+    <inkml:context xml:id="ctx0">
+      <inkml:inkSource xml:id="inkSrc0">
+        <inkml:traceFormat>
+          <inkml:channel name="X" type="integer" min="-2.14748E9" max="2.14748E9" units="cm"/>
+          <inkml:channel name="Y" type="integer" min="-2.14748E9" max="2.14748E9" units="cm"/>
+          <inkml:channel name="F" type="integer" max="32767" units="dev"/>
+        </inkml:traceFormat>
+        <inkml:channelProperties>
+          <inkml:channelProperty channel="X" name="resolution" value="1000" units="1/cm"/>
+          <inkml:channelProperty channel="Y" name="resolution" value="1000" units="1/cm"/>
+          <inkml:channelProperty channel="F" name="resolution" value="0" units="1/dev"/>
+        </inkml:channelProperties>
+      </inkml:inkSource>
+      <inkml:timestamp xml:id="ts0" timeString="2025-05-09T17:35:15.047"/>
+    </inkml:context>
+    <inkml:brush xml:id="br0">
+      <inkml:brushProperty name="width" value="0.35" units="cm"/>
+      <inkml:brushProperty name="height" value="0.35" units="cm"/>
+    </inkml:brush>
+  </inkml:definitions>
+  <inkml:trace contextRef="#ctx0" brushRef="#br0">0 1 24575,'1892'0'0,"-1877"0"0,0 0 0,-1 1 0,1 1 0,26 6 0,-36-7 0,0 1 0,0 0 0,0 0 0,-1 0 0,1 1 0,-1 0 0,0 0 0,0 0 0,0 0 0,0 0 0,0 1 0,-1 0 0,1 0 0,-1 0 0,0 0 0,0 0 0,3 8 0,0 2 0,-1 1 0,0 0 0,0 0 0,-2 0 0,0 1 0,-1-1 0,1 19 0,-7 114 0,1-92 0,-3 469 0,6-464 0,-1-39 0,-1 0 0,0-1 0,-2 0 0,-1 0 0,-13 39 0,-50 95 0,32-79 0,17-33 0,-75 155 0,8-13 0,1-4 0,51-108 0,21-42 0,-2-1 0,-22 36 0,7-23 0,-209 296 0,92-113 321,40-55-2007</inkml:trace>
+</inkml:ink>
+</file>
+
+<file path=ppt/ink/ink2.xml><?xml version="1.0" encoding="utf-8"?>
+<inkml:ink xmlns:inkml="http://www.w3.org/2003/InkML">
+  <inkml:definitions>
+    <inkml:context xml:id="ctx0">
+      <inkml:inkSource xml:id="inkSrc0">
+        <inkml:traceFormat>
+          <inkml:channel name="X" type="integer" min="-2.14748E9" max="2.14748E9" units="cm"/>
+          <inkml:channel name="Y" type="integer" min="-2.14748E9" max="2.14748E9" units="cm"/>
+          <inkml:channel name="F" type="integer" max="32767" units="dev"/>
+        </inkml:traceFormat>
+        <inkml:channelProperties>
+          <inkml:channelProperty channel="X" name="resolution" value="1000" units="1/cm"/>
+          <inkml:channelProperty channel="Y" name="resolution" value="1000" units="1/cm"/>
+          <inkml:channelProperty channel="F" name="resolution" value="0" units="1/dev"/>
+        </inkml:channelProperties>
+      </inkml:inkSource>
+      <inkml:timestamp xml:id="ts0" timeString="2025-05-09T17:32:56.826"/>
+    </inkml:context>
+    <inkml:brush xml:id="br0">
+      <inkml:brushProperty name="width" value="0.35" units="cm"/>
+      <inkml:brushProperty name="height" value="0.35" units="cm"/>
+    </inkml:brush>
+  </inkml:definitions>
+  <inkml:trace contextRef="#ctx0" brushRef="#br0">495 1276 24575,'-1'-1'0,"1"-1"0,-1 0 0,0 0 0,1 1 0,-1-1 0,1 0 0,-1 0 0,1 0 0,0 0 0,0 0 0,0 0 0,0 1 0,0-1 0,0 0 0,0 0 0,1 0 0,-1 0 0,1 0 0,0 1 0,1-4 0,0 2 0,0 0 0,0 0 0,0 0 0,1 1 0,-1-1 0,1 1 0,0 0 0,-1-1 0,1 1 0,5-2 0,5-2 0,-1 0 0,1 2 0,0-1 0,22-3 0,25-3 0,115-4 0,62 16 0,-87 1 0,1071-2 0,-1198 0 0,1-2 0,-1-1 0,1-1 0,-1-1 0,0 0 0,0-2 0,-1-1 0,38-19 0,-28 10 0,0-3 0,-1 0 0,-1-2 0,52-50 0,-72 61 0,0 0 0,-1 0 0,-1-1 0,0 0 0,0-1 0,-2 0 0,1 0 0,-2 0 0,1-1 0,-2 0 0,0 0 0,-1 0 0,3-24 0,-3 0 0,-1 0 0,-3 0 0,0 0 0,-9-41 0,7 60 0,-1 0 0,-1 0 0,-1 1 0,-1-1 0,-11-21 0,-53-83 0,32 58 0,28 47 0,0 0 0,-1 1 0,-1 1 0,-1 0 0,-23-22 0,29 31 0,-1 0 0,1 1 0,-1 0 0,0 1 0,0 0 0,-1 1 0,0-1 0,1 2 0,-1-1 0,0 2 0,-1-1 0,1 1 0,-14-1 0,-236 5 0,91 3 0,80-6 0,-135 4 0,192 0 0,0 1 0,1 2 0,0 1 0,-59 21 0,-61 44 0,77-34 0,-6 2 0,18-8 0,0-2 0,-68 20 0,113-44 0,1 1 0,-1 0 0,1 2 0,-20 13 0,-59 48 0,41-29 0,-141 113 0,103-85 0,4 5 0,-103 110 0,174-165 0,2 0 0,0 1 0,1 0 0,2 2 0,0-1 0,-17 44 0,8-16 0,-2 4 0,3 2 0,-26 103 0,31-79 0,4 1 0,-3 114 0,14-177 0,1 1 0,0-1 0,1 1 0,0-1 0,2 0 0,0 0 0,11 28 0,-1-12 0,1-1 0,2 0 0,1-1 0,1-1 0,34 40 0,-26-40 0,2-2 0,1 0 0,1-2 0,1-1 0,63 36 0,87 50 0,-127-77 0,-15-9 0,1-1 0,60 25 0,36 9 0,85 31 0,-183-76 0,1-2 0,0-1 0,74 6 0,74-10 0,-23-2 0,234 3 0,-310-8 0,-78 1 0,0-1 0,1 0 0,-1-1 0,0 0 0,-1-1 0,1 0 0,0-1 0,-1 0 0,0-1 0,0 0 0,12-8 0,0 0 0,268-148 0,-256 147 141,55-16 0,-12 5-1788</inkml:trace>
+</inkml:ink>
+</file>
+
+<file path=ppt/ink/ink3.xml><?xml version="1.0" encoding="utf-8"?>
+<inkml:ink xmlns:inkml="http://www.w3.org/2003/InkML">
+  <inkml:definitions>
+    <inkml:context xml:id="ctx0">
+      <inkml:inkSource xml:id="inkSrc0">
+        <inkml:traceFormat>
+          <inkml:channel name="X" type="integer" min="-2.14748E9" max="2.14748E9" units="cm"/>
+          <inkml:channel name="Y" type="integer" min="-2.14748E9" max="2.14748E9" units="cm"/>
+          <inkml:channel name="F" type="integer" max="32767" units="dev"/>
+        </inkml:traceFormat>
+        <inkml:channelProperties>
+          <inkml:channelProperty channel="X" name="resolution" value="1000" units="1/cm"/>
+          <inkml:channelProperty channel="Y" name="resolution" value="1000" units="1/cm"/>
+          <inkml:channelProperty channel="F" name="resolution" value="0" units="1/dev"/>
+        </inkml:channelProperties>
+      </inkml:inkSource>
+      <inkml:timestamp xml:id="ts0" timeString="2025-05-09T17:32:59.457"/>
+    </inkml:context>
+    <inkml:brush xml:id="br0">
+      <inkml:brushProperty name="width" value="0.35" units="cm"/>
+      <inkml:brushProperty name="height" value="0.35" units="cm"/>
+    </inkml:brush>
+  </inkml:definitions>
+  <inkml:trace contextRef="#ctx0" brushRef="#br0">161 0 24575,'-3'3'0,"-1"0"0,1 1 0,-1-1 0,1 1 0,0 0 0,0 0 0,1 0 0,-1 0 0,1 0 0,0 0 0,0 1 0,0-1 0,0 1 0,-1 8 0,-1 7 0,2-1 0,-2 25 0,3-32 0,0 20 0,-1-1 0,0-1 0,-9 37 0,-55 263 0,53-236 0,-1 149 0,16 1159-1365</inkml:trace>
+</inkml:ink>
+</file>
+
+<file path=ppt/ink/ink4.xml><?xml version="1.0" encoding="utf-8"?>
+<inkml:ink xmlns:inkml="http://www.w3.org/2003/InkML">
+  <inkml:definitions>
+    <inkml:context xml:id="ctx0">
+      <inkml:inkSource xml:id="inkSrc0">
+        <inkml:traceFormat>
+          <inkml:channel name="X" type="integer" min="-2.14748E9" max="2.14748E9" units="cm"/>
+          <inkml:channel name="Y" type="integer" min="-2.14748E9" max="2.14748E9" units="cm"/>
+          <inkml:channel name="F" type="integer" max="32767" units="dev"/>
+        </inkml:traceFormat>
+        <inkml:channelProperties>
+          <inkml:channelProperty channel="X" name="resolution" value="1000" units="1/cm"/>
+          <inkml:channelProperty channel="Y" name="resolution" value="1000" units="1/cm"/>
+          <inkml:channelProperty channel="F" name="resolution" value="0" units="1/dev"/>
+        </inkml:channelProperties>
+      </inkml:inkSource>
+      <inkml:timestamp xml:id="ts0" timeString="2025-05-09T17:33:01.327"/>
+    </inkml:context>
+    <inkml:brush xml:id="br0">
+      <inkml:brushProperty name="width" value="0.35" units="cm"/>
+      <inkml:brushProperty name="height" value="0.35" units="cm"/>
+    </inkml:brush>
+  </inkml:definitions>
+  <inkml:trace contextRef="#ctx0" brushRef="#br0">239 8 24575,'-4'1'0,"0"-1"0,1 1 0,-1 0 0,0 0 0,0 0 0,-6 4 0,-20 4 0,0-6 0,15-2 0,0 1 0,-1 1 0,-21 6 0,33-8 0,0 1 0,0-1 0,0 1 0,1 0 0,-1 0 0,0 1 0,1-1 0,0 1 0,0-1 0,0 1 0,0 0 0,0 0 0,0 1 0,1-1 0,-1 0 0,1 1 0,-3 6 0,5-9 0,-1 0 0,1 0 0,0 1 0,-1-1 0,1 0 0,0 0 0,0 1 0,0-1 0,0 0 0,0 1 0,0-1 0,0 0 0,0 0 0,1 1 0,-1-1 0,0 0 0,1 0 0,-1 0 0,1 1 0,-1-1 0,1 0 0,0 0 0,-1 0 0,1 0 0,0 0 0,0 0 0,0 0 0,0 0 0,0-1 0,0 1 0,0 0 0,0 0 0,0-1 0,0 1 0,0-1 0,0 1 0,3 0 0,0 1 0,1 0 0,0-1 0,0 0 0,0 0 0,0 0 0,0 0 0,0-1 0,7 1 0,-7-2 17,0 1 0,-1-1 0,1 0 1,0 0-1,-1-1 0,1 1 0,-1-1 0,1 0 0,-1 0 0,0 0 0,0-1 0,0 1 0,0-1 0,0 0 0,-1 0 0,1-1 0,-1 1 0,0-1 1,5-6-1,-4 3-188,0-1 0,0 0 1,0 0-1,-1-1 0,0 1 1,-1-1-1,0 1 0,0-1 1,0-14-1</inkml:trace>
+</inkml:ink>
+</file>
+
+<file path=ppt/ink/ink5.xml><?xml version="1.0" encoding="utf-8"?>
+<inkml:ink xmlns:inkml="http://www.w3.org/2003/InkML">
+  <inkml:definitions>
+    <inkml:context xml:id="ctx0">
+      <inkml:inkSource xml:id="inkSrc0">
+        <inkml:traceFormat>
+          <inkml:channel name="X" type="integer" min="-2.14748E9" max="2.14748E9" units="cm"/>
+          <inkml:channel name="Y" type="integer" min="-2.14748E9" max="2.14748E9" units="cm"/>
+          <inkml:channel name="F" type="integer" max="32767" units="dev"/>
+        </inkml:traceFormat>
+        <inkml:channelProperties>
+          <inkml:channelProperty channel="X" name="resolution" value="1000" units="1/cm"/>
+          <inkml:channelProperty channel="Y" name="resolution" value="1000" units="1/cm"/>
+          <inkml:channelProperty channel="F" name="resolution" value="0" units="1/dev"/>
+        </inkml:channelProperties>
+      </inkml:inkSource>
+      <inkml:timestamp xml:id="ts0" timeString="2025-05-09T17:33:05.886"/>
+    </inkml:context>
+    <inkml:brush xml:id="br0">
+      <inkml:brushProperty name="width" value="0.35" units="cm"/>
+      <inkml:brushProperty name="height" value="0.35" units="cm"/>
+    </inkml:brush>
+  </inkml:definitions>
+  <inkml:trace contextRef="#ctx0" brushRef="#br0">2052 73 24575,'1'0'0,"-1"-1"0,0 1 0,1-1 0,-1 0 0,0 1 0,0-1 0,0 1 0,1-1 0,-1 0 0,0 1 0,0-1 0,0 1 0,0-1 0,0 0 0,0 1 0,0-1 0,-1 0 0,1 1 0,0-1 0,0 1 0,0-1 0,-1 0 0,1 1 0,0-1 0,0 1 0,-1-1 0,1 1 0,-1-1 0,1 1 0,0-1 0,-1 1 0,1-1 0,-1 1 0,1 0 0,-1-1 0,1 1 0,-1 0 0,0-1 0,0 1 0,-24-14 0,2 8 0,0 1 0,0 0 0,-1 2 0,1 1 0,-1 1 0,-33 2 0,-46-3 0,-574-12 0,454 15 0,204 0 0,-1 1 0,0 1 0,0 1 0,1 1 0,-1 0 0,1 2 0,1 0 0,-1 1 0,1 0 0,1 2 0,0 0 0,-21 17 0,-18 17 0,1 3 0,-49 56 0,98-97 0,-18 18 0,1 1 0,1 1 0,1 0 0,1 2 0,2 1 0,1 0 0,1 1 0,-15 40 0,2 10 0,-50 152 0,69-194 0,2 1 0,1-1 0,2 2 0,0 49 0,10 442 0,-3-474 0,3 0 0,2-1 0,2 0 0,34 110 0,-34-142 0,2-1 0,1 0 0,0 0 0,2-1 0,0-1 0,2 0 0,0-1 0,1-1 0,1-1 0,1 0 0,22 16 0,-30-27 0,0 0 0,1 0 0,0-2 0,0 1 0,1-1 0,-1-1 0,1 0 0,14 2 0,37 12 0,58 34 0,-17-6 0,-62-31 0,1-3 0,-1-1 0,2-2 0,81 6 0,185-12 0,-195-5 0,-2 2 0,139-4 0,-231 2 0,0-1 0,-1-1 0,1-1 0,-1-1 0,37-15 0,94-57 0,-93 46 0,-19 9 0,-1-2 0,-2-1 0,0-2 0,-2-1 0,-1-2 0,38-45 0,-31 27 0,-2-3 0,-3-1 0,57-110 0,-77 125 0,-2 0 0,-2-1 0,-1-1 0,7-48 0,-13 48 0,-2 0 0,-1-43 0,-3 40 0,9-62 0,13-45 0,4-238 0,-24 285 0,-4-106 0,2 202 0,0 0 0,-1 0 0,0 0 0,-1 0 0,1 0 0,-1 1 0,-1-1 0,1 1 0,-1 0 0,0 0 0,0 0 0,-10-9 0,-7-6 0,-42-33 0,39 35 0,-1 1 0,-1 0 0,0 2 0,-36-15 0,10 4 0,27 15 0,0 1 0,0 0 0,-1 2 0,-53-11 0,38 14 0,-1 1 0,-65 1 0,-45-3-259,120 5-847</inkml:trace>
+</inkml:ink>
+</file>
+
+<file path=ppt/ink/ink6.xml><?xml version="1.0" encoding="utf-8"?>
+<inkml:ink xmlns:inkml="http://www.w3.org/2003/InkML">
+  <inkml:definitions>
+    <inkml:context xml:id="ctx0">
+      <inkml:inkSource xml:id="inkSrc0">
+        <inkml:traceFormat>
+          <inkml:channel name="X" type="integer" min="-2.14748E9" max="2.14748E9" units="cm"/>
+          <inkml:channel name="Y" type="integer" min="-2.14748E9" max="2.14748E9" units="cm"/>
+          <inkml:channel name="F" type="integer" max="32767" units="dev"/>
+        </inkml:traceFormat>
+        <inkml:channelProperties>
+          <inkml:channelProperty channel="X" name="resolution" value="1000" units="1/cm"/>
+          <inkml:channelProperty channel="Y" name="resolution" value="1000" units="1/cm"/>
+          <inkml:channelProperty channel="F" name="resolution" value="0" units="1/dev"/>
+        </inkml:channelProperties>
+      </inkml:inkSource>
+      <inkml:timestamp xml:id="ts0" timeString="2025-05-09T17:33:11.396"/>
+    </inkml:context>
+    <inkml:brush xml:id="br0">
+      <inkml:brushProperty name="width" value="0.35" units="cm"/>
+      <inkml:brushProperty name="height" value="0.35" units="cm"/>
+    </inkml:brush>
+  </inkml:definitions>
+  <inkml:trace contextRef="#ctx0" brushRef="#br0">0 153 24575,'0'1364'0,"1"-1331"0,1 1 0,2-1 0,1 1 0,2-1 0,1 0 0,2-1 0,23 55 0,-8-25 0,14 29 0,-33-80 0,0 0 0,0-1 0,2 0 0,-1 0 0,17 16 0,33 30 0,65 56 0,-107-100 0,1-1 0,0-1 0,0-1 0,1 0 0,1-1 0,29 10 0,41 6 0,0-5 0,1-3 0,1-4 0,160 1 0,-237-13 0,3 1 0,0-1 0,0-1 0,1 0 0,-1-1 0,0-1 0,0 0 0,0-1 0,21-9 0,81-39 0,-70 33 0,-2-2 0,-1-2 0,53-35 0,121-117 0,-184 142 0,-2-1 0,-1-1 0,49-72 0,-69 84 0,0 0 0,-2-1 0,0 0 0,11-48 0,9-21 0,-16 56 0,18-45 0,27-112 0,-50 164 0,24-58 0,-22 65 0,-2-1 0,0 0 0,-2-1 0,5-26 0,6-158 0,4-82 292,-23-1-614,-1 108-1013</inkml:trace>
+</inkml:ink>
+</file>
+
+<file path=ppt/ink/ink7.xml><?xml version="1.0" encoding="utf-8"?>
+<inkml:ink xmlns:inkml="http://www.w3.org/2003/InkML">
+  <inkml:definitions>
+    <inkml:context xml:id="ctx0">
+      <inkml:inkSource xml:id="inkSrc0">
+        <inkml:traceFormat>
+          <inkml:channel name="X" type="integer" min="-2.14748E9" max="2.14748E9" units="cm"/>
+          <inkml:channel name="Y" type="integer" min="-2.14748E9" max="2.14748E9" units="cm"/>
+          <inkml:channel name="F" type="integer" max="32767" units="dev"/>
+        </inkml:traceFormat>
+        <inkml:channelProperties>
+          <inkml:channelProperty channel="X" name="resolution" value="1000" units="1/cm"/>
+          <inkml:channelProperty channel="Y" name="resolution" value="1000" units="1/cm"/>
+          <inkml:channelProperty channel="F" name="resolution" value="0" units="1/dev"/>
+        </inkml:channelProperties>
+      </inkml:inkSource>
+      <inkml:timestamp xml:id="ts0" timeString="2025-05-09T17:34:51.838"/>
+    </inkml:context>
+    <inkml:brush xml:id="br0">
+      <inkml:brushProperty name="width" value="0.35" units="cm"/>
+      <inkml:brushProperty name="height" value="0.35" units="cm"/>
+    </inkml:brush>
+  </inkml:definitions>
+  <inkml:trace contextRef="#ctx0" brushRef="#br0">0 696 24575,'508'-696'0</inkml:trace>
+</inkml:ink>
+</file>
+
+<file path=ppt/ink/ink8.xml><?xml version="1.0" encoding="utf-8"?>
+<inkml:ink xmlns:inkml="http://www.w3.org/2003/InkML">
+  <inkml:definitions>
+    <inkml:context xml:id="ctx0">
+      <inkml:inkSource xml:id="inkSrc0">
+        <inkml:traceFormat>
+          <inkml:channel name="X" type="integer" min="-2.14748E9" max="2.14748E9" units="cm"/>
+          <inkml:channel name="Y" type="integer" min="-2.14748E9" max="2.14748E9" units="cm"/>
+          <inkml:channel name="F" type="integer" max="32767" units="dev"/>
+        </inkml:traceFormat>
+        <inkml:channelProperties>
+          <inkml:channelProperty channel="X" name="resolution" value="1000" units="1/cm"/>
+          <inkml:channelProperty channel="Y" name="resolution" value="1000" units="1/cm"/>
+          <inkml:channelProperty channel="F" name="resolution" value="0" units="1/dev"/>
+        </inkml:channelProperties>
+      </inkml:inkSource>
+      <inkml:timestamp xml:id="ts0" timeString="2025-05-09T17:34:55.547"/>
+    </inkml:context>
+    <inkml:brush xml:id="br0">
+      <inkml:brushProperty name="width" value="0.35" units="cm"/>
+      <inkml:brushProperty name="height" value="0.35" units="cm"/>
+    </inkml:brush>
+  </inkml:definitions>
+  <inkml:trace contextRef="#ctx0" brushRef="#br0">163 0 24575,'0'21'0,"-3"144"0,0-131 0,-2 0 0,-14 59 0,-33 112 0,41-153 0,-5 105 0,14-94 0,2-8 0,-3 0 0,-11 57 0,-1-24 0,-4 148 0,19 90 0,3-141 0,-5 76 0,5 234 0,1-415 0,4 0 0,25 114 0,-21-137-1365</inkml:trace>
+</inkml:ink>
+</file>
+
+<file path=ppt/ink/ink9.xml><?xml version="1.0" encoding="utf-8"?>
+<inkml:ink xmlns:inkml="http://www.w3.org/2003/InkML">
+  <inkml:definitions>
+    <inkml:context xml:id="ctx0">
+      <inkml:inkSource xml:id="inkSrc0">
+        <inkml:traceFormat>
+          <inkml:channel name="X" type="integer" min="-2.14748E9" max="2.14748E9" units="cm"/>
+          <inkml:channel name="Y" type="integer" min="-2.14748E9" max="2.14748E9" units="cm"/>
+          <inkml:channel name="F" type="integer" max="32767" units="dev"/>
+        </inkml:traceFormat>
+        <inkml:channelProperties>
+          <inkml:channelProperty channel="X" name="resolution" value="1000" units="1/cm"/>
+          <inkml:channelProperty channel="Y" name="resolution" value="1000" units="1/cm"/>
+          <inkml:channelProperty channel="F" name="resolution" value="0" units="1/dev"/>
+        </inkml:channelProperties>
+      </inkml:inkSource>
+      <inkml:timestamp xml:id="ts0" timeString="2025-05-09T17:35:01.656"/>
+    </inkml:context>
+    <inkml:brush xml:id="br0">
+      <inkml:brushProperty name="width" value="0.35" units="cm"/>
+      <inkml:brushProperty name="height" value="0.35" units="cm"/>
+    </inkml:brush>
+  </inkml:definitions>
+  <inkml:trace contextRef="#ctx0" brushRef="#br0">2217 1 24575,'-132'-1'0,"-366"13"0,180 2 0,169-10 0,114 0 0,1 1 0,-1 1 0,-49 17 0,41-11 0,-68 11 0,21-18 0,62-4 0,1 0 0,-1 2 0,-27 6 0,48-7 0,0 0 0,0 1 0,1-1 0,-1 2 0,1-1 0,-1 1 0,1-1 0,1 2 0,-1-1 0,0 1 0,-8 9 0,7-6 0,1 1 0,0 0 0,0 0 0,1 0 0,0 1 0,1-1 0,-4 13 0,0 6 0,2 0 0,1 1 0,1-1 0,-1 56 0,8 91 0,-1-111 0,-2-46 0,-1-1 0,0 0 0,-2 0 0,-6 26 0,-27 64 0,22-69 0,-15 66 0,18-51 0,-1 2 0,-7 97 0,18-144 0,1 1 0,0-1 0,1 1 0,0-1 0,0 1 0,4 13 0,-3-19 0,-1 0 0,0 0 0,1 0 0,0 0 0,-1 0 0,1-1 0,0 1 0,1 0 0,-1-1 0,0 1 0,1-1 0,-1 0 0,1 0 0,0 0 0,0 0 0,0 0 0,0-1 0,0 1 0,4 0 0,5 2 0,-1-1 0,1-1 0,-1 0 0,1-1 0,18 0 0,64-6 0,-71 3 0,319-23 0,-311 20 0,-1-1 0,1-1 0,35-15 0,-27 9 0,44-9 0,-70 20 0,0 0 0,0 0 0,1 2 0,-1-1 0,1 2 0,-1 0 0,19 4 0,-11 0 0,-1 2 0,0 0 0,0 2 0,0 0 0,-1 1 0,-1 1 0,0 0 0,27 23 0,-6 1 0,-2 1 0,47 56 0,-61-62 0,-1 0 0,32 61 0,23 72 0,-6-11 0,-19-40 0,56 169 0,-72-189 0,-23-64 0,-2 1 0,-1 0 0,-1 0 0,-1 1 0,4 37 0,-10-40 0,0 0 0,-2 1 0,-1-1 0,-1 0 0,-1 0 0,-8 31 0,8-48 0,-1 1 0,0 0 0,0-1 0,-1 0 0,0 0 0,-1 0 0,0-1 0,0 0 0,-1 0 0,-1 0 0,1-1 0,-1 0 0,0 0 0,-1-1 0,0-1 0,0 1 0,-19 9 0,-28 8 0,-83 25 0,-4 2 0,-36 29 0,-19 7 0,157-69 0,-2-3 0,0-2 0,-1-1 0,0-3 0,-1-1 0,-56 2 0,-302-15 0,384 3 0,1 0 0,0-1 0,0-1 0,1 0 0,-1-1 0,1-1 0,0-1 0,0-1 0,1 0 0,0-1 0,-19-14 0,6 0 0,2 0 0,1-2 0,0-1 0,-37-50 0,-48-61-1365</inkml:trace>
+</inkml:ink>
 </file>
 
 <file path=ppt/slideLayouts/slideLayout1.xml><?xml version="1.0" encoding="utf-8"?>
@@ -258,7 +590,7 @@
           <a:p>
             <a:fld id="{77279A5E-81BC-4498-A39F-BA4AEA1BAFC4}" type="datetimeFigureOut">
               <a:rPr lang="es-MX" smtClean="0"/>
-              <a:t>05/05/2025</a:t>
+              <a:t>09/05/2025</a:t>
             </a:fld>
             <a:endParaRPr lang="es-MX"/>
           </a:p>
@@ -458,7 +790,7 @@
           <a:p>
             <a:fld id="{77279A5E-81BC-4498-A39F-BA4AEA1BAFC4}" type="datetimeFigureOut">
               <a:rPr lang="es-MX" smtClean="0"/>
-              <a:t>05/05/2025</a:t>
+              <a:t>09/05/2025</a:t>
             </a:fld>
             <a:endParaRPr lang="es-MX"/>
           </a:p>
@@ -668,7 +1000,7 @@
           <a:p>
             <a:fld id="{77279A5E-81BC-4498-A39F-BA4AEA1BAFC4}" type="datetimeFigureOut">
               <a:rPr lang="es-MX" smtClean="0"/>
-              <a:t>05/05/2025</a:t>
+              <a:t>09/05/2025</a:t>
             </a:fld>
             <a:endParaRPr lang="es-MX"/>
           </a:p>
@@ -868,7 +1200,7 @@
           <a:p>
             <a:fld id="{77279A5E-81BC-4498-A39F-BA4AEA1BAFC4}" type="datetimeFigureOut">
               <a:rPr lang="es-MX" smtClean="0"/>
-              <a:t>05/05/2025</a:t>
+              <a:t>09/05/2025</a:t>
             </a:fld>
             <a:endParaRPr lang="es-MX"/>
           </a:p>
@@ -1144,7 +1476,7 @@
           <a:p>
             <a:fld id="{77279A5E-81BC-4498-A39F-BA4AEA1BAFC4}" type="datetimeFigureOut">
               <a:rPr lang="es-MX" smtClean="0"/>
-              <a:t>05/05/2025</a:t>
+              <a:t>09/05/2025</a:t>
             </a:fld>
             <a:endParaRPr lang="es-MX"/>
           </a:p>
@@ -1412,7 +1744,7 @@
           <a:p>
             <a:fld id="{77279A5E-81BC-4498-A39F-BA4AEA1BAFC4}" type="datetimeFigureOut">
               <a:rPr lang="es-MX" smtClean="0"/>
-              <a:t>05/05/2025</a:t>
+              <a:t>09/05/2025</a:t>
             </a:fld>
             <a:endParaRPr lang="es-MX"/>
           </a:p>
@@ -1827,7 +2159,7 @@
           <a:p>
             <a:fld id="{77279A5E-81BC-4498-A39F-BA4AEA1BAFC4}" type="datetimeFigureOut">
               <a:rPr lang="es-MX" smtClean="0"/>
-              <a:t>05/05/2025</a:t>
+              <a:t>09/05/2025</a:t>
             </a:fld>
             <a:endParaRPr lang="es-MX"/>
           </a:p>
@@ -1969,7 +2301,7 @@
           <a:p>
             <a:fld id="{77279A5E-81BC-4498-A39F-BA4AEA1BAFC4}" type="datetimeFigureOut">
               <a:rPr lang="es-MX" smtClean="0"/>
-              <a:t>05/05/2025</a:t>
+              <a:t>09/05/2025</a:t>
             </a:fld>
             <a:endParaRPr lang="es-MX"/>
           </a:p>
@@ -2082,7 +2414,7 @@
           <a:p>
             <a:fld id="{77279A5E-81BC-4498-A39F-BA4AEA1BAFC4}" type="datetimeFigureOut">
               <a:rPr lang="es-MX" smtClean="0"/>
-              <a:t>05/05/2025</a:t>
+              <a:t>09/05/2025</a:t>
             </a:fld>
             <a:endParaRPr lang="es-MX"/>
           </a:p>
@@ -2395,7 +2727,7 @@
           <a:p>
             <a:fld id="{77279A5E-81BC-4498-A39F-BA4AEA1BAFC4}" type="datetimeFigureOut">
               <a:rPr lang="es-MX" smtClean="0"/>
-              <a:t>05/05/2025</a:t>
+              <a:t>09/05/2025</a:t>
             </a:fld>
             <a:endParaRPr lang="es-MX"/>
           </a:p>
@@ -2684,7 +3016,7 @@
           <a:p>
             <a:fld id="{77279A5E-81BC-4498-A39F-BA4AEA1BAFC4}" type="datetimeFigureOut">
               <a:rPr lang="es-MX" smtClean="0"/>
-              <a:t>05/05/2025</a:t>
+              <a:t>09/05/2025</a:t>
             </a:fld>
             <a:endParaRPr lang="es-MX"/>
           </a:p>
@@ -2927,7 +3259,7 @@
           <a:p>
             <a:fld id="{77279A5E-81BC-4498-A39F-BA4AEA1BAFC4}" type="datetimeFigureOut">
               <a:rPr lang="es-MX" smtClean="0"/>
-              <a:t>05/05/2025</a:t>
+              <a:t>09/05/2025</a:t>
             </a:fld>
             <a:endParaRPr lang="es-MX"/>
           </a:p>
@@ -5878,6 +6210,2495 @@
 </p:sld>
 </file>
 
+<file path=ppt/slides/slide4.xml><?xml version="1.0" encoding="utf-8"?>
+<p:sld xmlns:a="http://schemas.openxmlformats.org/drawingml/2006/main" xmlns:r="http://schemas.openxmlformats.org/officeDocument/2006/relationships" xmlns:p="http://schemas.openxmlformats.org/presentationml/2006/main">
+  <p:cSld>
+    <p:bg>
+      <p:bgPr>
+        <a:solidFill>
+          <a:schemeClr val="accent2">
+            <a:lumMod val="40000"/>
+            <a:lumOff val="60000"/>
+          </a:schemeClr>
+        </a:solidFill>
+        <a:effectLst/>
+      </p:bgPr>
+    </p:bg>
+    <p:spTree>
+      <p:nvGrpSpPr>
+        <p:cNvPr id="1" name="">
+          <a:extLst>
+            <a:ext uri="{FF2B5EF4-FFF2-40B4-BE49-F238E27FC236}">
+              <a16:creationId xmlns:a16="http://schemas.microsoft.com/office/drawing/2014/main" id="{F4EF143F-7A7B-F24E-49EF-42952DCAB4B8}"/>
+            </a:ext>
+          </a:extLst>
+        </p:cNvPr>
+        <p:cNvGrpSpPr/>
+        <p:nvPr/>
+      </p:nvGrpSpPr>
+      <p:grpSpPr>
+        <a:xfrm>
+          <a:off x="0" y="0"/>
+          <a:ext cx="0" cy="0"/>
+          <a:chOff x="0" y="0"/>
+          <a:chExt cx="0" cy="0"/>
+        </a:xfrm>
+      </p:grpSpPr>
+      <p:sp>
+        <p:nvSpPr>
+          <p:cNvPr id="4" name="Rectángulo 3">
+            <a:extLst>
+              <a:ext uri="{FF2B5EF4-FFF2-40B4-BE49-F238E27FC236}">
+                <a16:creationId xmlns:a16="http://schemas.microsoft.com/office/drawing/2014/main" id="{7B9974C8-D65A-9364-F85D-CDCDE7AEAB12}"/>
+              </a:ext>
+            </a:extLst>
+          </p:cNvPr>
+          <p:cNvSpPr/>
+          <p:nvPr/>
+        </p:nvSpPr>
+        <p:spPr>
+          <a:xfrm>
+            <a:off x="148185" y="217912"/>
+            <a:ext cx="1800000" cy="1800000"/>
+          </a:xfrm>
+          <a:prstGeom prst="rect">
+            <a:avLst/>
+          </a:prstGeom>
+          <a:ln>
+            <a:noFill/>
+          </a:ln>
+        </p:spPr>
+        <p:style>
+          <a:lnRef idx="2">
+            <a:schemeClr val="accent6"/>
+          </a:lnRef>
+          <a:fillRef idx="1">
+            <a:schemeClr val="lt1"/>
+          </a:fillRef>
+          <a:effectRef idx="0">
+            <a:schemeClr val="accent6"/>
+          </a:effectRef>
+          <a:fontRef idx="minor">
+            <a:schemeClr val="dk1"/>
+          </a:fontRef>
+        </p:style>
+        <p:txBody>
+          <a:bodyPr rtlCol="0" anchor="ctr"/>
+          <a:lstStyle/>
+          <a:p>
+            <a:pPr algn="ctr"/>
+            <a:endParaRPr lang="es-MX" u="sng"/>
+          </a:p>
+        </p:txBody>
+      </p:sp>
+      <p:sp>
+        <p:nvSpPr>
+          <p:cNvPr id="5" name="Rectángulo 4">
+            <a:extLst>
+              <a:ext uri="{FF2B5EF4-FFF2-40B4-BE49-F238E27FC236}">
+                <a16:creationId xmlns:a16="http://schemas.microsoft.com/office/drawing/2014/main" id="{8FF73893-9A13-C690-28B1-98A4C676DB16}"/>
+              </a:ext>
+            </a:extLst>
+          </p:cNvPr>
+          <p:cNvSpPr/>
+          <p:nvPr/>
+        </p:nvSpPr>
+        <p:spPr>
+          <a:xfrm>
+            <a:off x="2546191" y="217912"/>
+            <a:ext cx="1800000" cy="1800000"/>
+          </a:xfrm>
+          <a:prstGeom prst="rect">
+            <a:avLst/>
+          </a:prstGeom>
+          <a:ln>
+            <a:noFill/>
+          </a:ln>
+        </p:spPr>
+        <p:style>
+          <a:lnRef idx="2">
+            <a:schemeClr val="accent6"/>
+          </a:lnRef>
+          <a:fillRef idx="1">
+            <a:schemeClr val="lt1"/>
+          </a:fillRef>
+          <a:effectRef idx="0">
+            <a:schemeClr val="accent6"/>
+          </a:effectRef>
+          <a:fontRef idx="minor">
+            <a:schemeClr val="dk1"/>
+          </a:fontRef>
+        </p:style>
+        <p:txBody>
+          <a:bodyPr rtlCol="0" anchor="ctr"/>
+          <a:lstStyle/>
+          <a:p>
+            <a:pPr algn="ctr"/>
+            <a:endParaRPr lang="es-MX" u="sng"/>
+          </a:p>
+        </p:txBody>
+      </p:sp>
+      <p:sp>
+        <p:nvSpPr>
+          <p:cNvPr id="6" name="Rectángulo 5">
+            <a:extLst>
+              <a:ext uri="{FF2B5EF4-FFF2-40B4-BE49-F238E27FC236}">
+                <a16:creationId xmlns:a16="http://schemas.microsoft.com/office/drawing/2014/main" id="{4546A84E-2F69-7C21-2213-38140F7753F6}"/>
+              </a:ext>
+            </a:extLst>
+          </p:cNvPr>
+          <p:cNvSpPr/>
+          <p:nvPr/>
+        </p:nvSpPr>
+        <p:spPr>
+          <a:xfrm>
+            <a:off x="5184463" y="217912"/>
+            <a:ext cx="1800000" cy="1800000"/>
+          </a:xfrm>
+          <a:prstGeom prst="rect">
+            <a:avLst/>
+          </a:prstGeom>
+          <a:ln>
+            <a:noFill/>
+          </a:ln>
+        </p:spPr>
+        <p:style>
+          <a:lnRef idx="2">
+            <a:schemeClr val="accent6"/>
+          </a:lnRef>
+          <a:fillRef idx="1">
+            <a:schemeClr val="lt1"/>
+          </a:fillRef>
+          <a:effectRef idx="0">
+            <a:schemeClr val="accent6"/>
+          </a:effectRef>
+          <a:fontRef idx="minor">
+            <a:schemeClr val="dk1"/>
+          </a:fontRef>
+        </p:style>
+        <p:txBody>
+          <a:bodyPr rtlCol="0" anchor="ctr"/>
+          <a:lstStyle/>
+          <a:p>
+            <a:pPr algn="ctr"/>
+            <a:endParaRPr lang="es-MX" u="sng"/>
+          </a:p>
+        </p:txBody>
+      </p:sp>
+      <p:sp>
+        <p:nvSpPr>
+          <p:cNvPr id="7" name="Rectángulo 6">
+            <a:extLst>
+              <a:ext uri="{FF2B5EF4-FFF2-40B4-BE49-F238E27FC236}">
+                <a16:creationId xmlns:a16="http://schemas.microsoft.com/office/drawing/2014/main" id="{14D39542-02CC-A0D4-93F2-0C56469425DB}"/>
+              </a:ext>
+            </a:extLst>
+          </p:cNvPr>
+          <p:cNvSpPr/>
+          <p:nvPr/>
+        </p:nvSpPr>
+        <p:spPr>
+          <a:xfrm>
+            <a:off x="7342203" y="217912"/>
+            <a:ext cx="1800000" cy="1800000"/>
+          </a:xfrm>
+          <a:prstGeom prst="rect">
+            <a:avLst/>
+          </a:prstGeom>
+          <a:ln>
+            <a:noFill/>
+          </a:ln>
+        </p:spPr>
+        <p:style>
+          <a:lnRef idx="2">
+            <a:schemeClr val="accent6"/>
+          </a:lnRef>
+          <a:fillRef idx="1">
+            <a:schemeClr val="lt1"/>
+          </a:fillRef>
+          <a:effectRef idx="0">
+            <a:schemeClr val="accent6"/>
+          </a:effectRef>
+          <a:fontRef idx="minor">
+            <a:schemeClr val="dk1"/>
+          </a:fontRef>
+        </p:style>
+        <p:txBody>
+          <a:bodyPr rtlCol="0" anchor="ctr"/>
+          <a:lstStyle/>
+          <a:p>
+            <a:pPr algn="ctr"/>
+            <a:endParaRPr lang="es-MX" u="sng"/>
+          </a:p>
+        </p:txBody>
+      </p:sp>
+      <p:sp>
+        <p:nvSpPr>
+          <p:cNvPr id="8" name="Rectángulo 7">
+            <a:extLst>
+              <a:ext uri="{FF2B5EF4-FFF2-40B4-BE49-F238E27FC236}">
+                <a16:creationId xmlns:a16="http://schemas.microsoft.com/office/drawing/2014/main" id="{18278625-BAD1-EDF5-064C-0C9C95A433BA}"/>
+              </a:ext>
+            </a:extLst>
+          </p:cNvPr>
+          <p:cNvSpPr/>
+          <p:nvPr/>
+        </p:nvSpPr>
+        <p:spPr>
+          <a:xfrm>
+            <a:off x="9499943" y="217912"/>
+            <a:ext cx="1800000" cy="1800000"/>
+          </a:xfrm>
+          <a:prstGeom prst="rect">
+            <a:avLst/>
+          </a:prstGeom>
+          <a:ln>
+            <a:noFill/>
+          </a:ln>
+        </p:spPr>
+        <p:style>
+          <a:lnRef idx="2">
+            <a:schemeClr val="accent6"/>
+          </a:lnRef>
+          <a:fillRef idx="1">
+            <a:schemeClr val="lt1"/>
+          </a:fillRef>
+          <a:effectRef idx="0">
+            <a:schemeClr val="accent6"/>
+          </a:effectRef>
+          <a:fontRef idx="minor">
+            <a:schemeClr val="dk1"/>
+          </a:fontRef>
+        </p:style>
+        <p:txBody>
+          <a:bodyPr rtlCol="0" anchor="ctr"/>
+          <a:lstStyle/>
+          <a:p>
+            <a:pPr algn="ctr"/>
+            <a:endParaRPr lang="es-MX" u="sng"/>
+          </a:p>
+        </p:txBody>
+      </p:sp>
+      <p:sp>
+        <p:nvSpPr>
+          <p:cNvPr id="9" name="Rectángulo 8">
+            <a:extLst>
+              <a:ext uri="{FF2B5EF4-FFF2-40B4-BE49-F238E27FC236}">
+                <a16:creationId xmlns:a16="http://schemas.microsoft.com/office/drawing/2014/main" id="{D72CEA3E-C7A3-B1E2-66AA-E10E050E0F78}"/>
+              </a:ext>
+            </a:extLst>
+          </p:cNvPr>
+          <p:cNvSpPr/>
+          <p:nvPr/>
+        </p:nvSpPr>
+        <p:spPr>
+          <a:xfrm>
+            <a:off x="148185" y="2435619"/>
+            <a:ext cx="1800000" cy="1800000"/>
+          </a:xfrm>
+          <a:prstGeom prst="rect">
+            <a:avLst/>
+          </a:prstGeom>
+          <a:ln>
+            <a:noFill/>
+          </a:ln>
+        </p:spPr>
+        <p:style>
+          <a:lnRef idx="2">
+            <a:schemeClr val="accent6"/>
+          </a:lnRef>
+          <a:fillRef idx="1">
+            <a:schemeClr val="lt1"/>
+          </a:fillRef>
+          <a:effectRef idx="0">
+            <a:schemeClr val="accent6"/>
+          </a:effectRef>
+          <a:fontRef idx="minor">
+            <a:schemeClr val="dk1"/>
+          </a:fontRef>
+        </p:style>
+        <p:txBody>
+          <a:bodyPr rtlCol="0" anchor="ctr"/>
+          <a:lstStyle/>
+          <a:p>
+            <a:pPr algn="ctr"/>
+            <a:endParaRPr lang="es-MX" u="sng"/>
+          </a:p>
+        </p:txBody>
+      </p:sp>
+      <p:sp>
+        <p:nvSpPr>
+          <p:cNvPr id="10" name="Rectángulo 9">
+            <a:extLst>
+              <a:ext uri="{FF2B5EF4-FFF2-40B4-BE49-F238E27FC236}">
+                <a16:creationId xmlns:a16="http://schemas.microsoft.com/office/drawing/2014/main" id="{8E59E060-0F59-86D0-5ACB-15E58ED53D52}"/>
+              </a:ext>
+            </a:extLst>
+          </p:cNvPr>
+          <p:cNvSpPr/>
+          <p:nvPr/>
+        </p:nvSpPr>
+        <p:spPr>
+          <a:xfrm>
+            <a:off x="2546191" y="2435619"/>
+            <a:ext cx="1800000" cy="1800000"/>
+          </a:xfrm>
+          <a:prstGeom prst="rect">
+            <a:avLst/>
+          </a:prstGeom>
+          <a:ln>
+            <a:noFill/>
+          </a:ln>
+        </p:spPr>
+        <p:style>
+          <a:lnRef idx="2">
+            <a:schemeClr val="accent6"/>
+          </a:lnRef>
+          <a:fillRef idx="1">
+            <a:schemeClr val="lt1"/>
+          </a:fillRef>
+          <a:effectRef idx="0">
+            <a:schemeClr val="accent6"/>
+          </a:effectRef>
+          <a:fontRef idx="minor">
+            <a:schemeClr val="dk1"/>
+          </a:fontRef>
+        </p:style>
+        <p:txBody>
+          <a:bodyPr rtlCol="0" anchor="ctr"/>
+          <a:lstStyle/>
+          <a:p>
+            <a:pPr algn="ctr"/>
+            <a:endParaRPr lang="es-MX" u="sng"/>
+          </a:p>
+        </p:txBody>
+      </p:sp>
+      <p:sp>
+        <p:nvSpPr>
+          <p:cNvPr id="11" name="Rectángulo 10">
+            <a:extLst>
+              <a:ext uri="{FF2B5EF4-FFF2-40B4-BE49-F238E27FC236}">
+                <a16:creationId xmlns:a16="http://schemas.microsoft.com/office/drawing/2014/main" id="{69F30D7B-FCCC-D824-D3FF-3A842FAA86A5}"/>
+              </a:ext>
+            </a:extLst>
+          </p:cNvPr>
+          <p:cNvSpPr/>
+          <p:nvPr/>
+        </p:nvSpPr>
+        <p:spPr>
+          <a:xfrm>
+            <a:off x="5184463" y="2435619"/>
+            <a:ext cx="1800000" cy="1800000"/>
+          </a:xfrm>
+          <a:prstGeom prst="rect">
+            <a:avLst/>
+          </a:prstGeom>
+          <a:ln>
+            <a:noFill/>
+          </a:ln>
+        </p:spPr>
+        <p:style>
+          <a:lnRef idx="2">
+            <a:schemeClr val="accent6"/>
+          </a:lnRef>
+          <a:fillRef idx="1">
+            <a:schemeClr val="lt1"/>
+          </a:fillRef>
+          <a:effectRef idx="0">
+            <a:schemeClr val="accent6"/>
+          </a:effectRef>
+          <a:fontRef idx="minor">
+            <a:schemeClr val="dk1"/>
+          </a:fontRef>
+        </p:style>
+        <p:txBody>
+          <a:bodyPr rtlCol="0" anchor="ctr"/>
+          <a:lstStyle/>
+          <a:p>
+            <a:pPr algn="ctr"/>
+            <a:endParaRPr lang="es-MX" u="sng"/>
+          </a:p>
+        </p:txBody>
+      </p:sp>
+      <p:sp>
+        <p:nvSpPr>
+          <p:cNvPr id="12" name="Rectángulo 11">
+            <a:extLst>
+              <a:ext uri="{FF2B5EF4-FFF2-40B4-BE49-F238E27FC236}">
+                <a16:creationId xmlns:a16="http://schemas.microsoft.com/office/drawing/2014/main" id="{18EE55F8-1F76-E9D5-D339-5EF14677A013}"/>
+              </a:ext>
+            </a:extLst>
+          </p:cNvPr>
+          <p:cNvSpPr/>
+          <p:nvPr/>
+        </p:nvSpPr>
+        <p:spPr>
+          <a:xfrm>
+            <a:off x="7342203" y="2435619"/>
+            <a:ext cx="1800000" cy="1800000"/>
+          </a:xfrm>
+          <a:prstGeom prst="rect">
+            <a:avLst/>
+          </a:prstGeom>
+          <a:ln>
+            <a:noFill/>
+          </a:ln>
+        </p:spPr>
+        <p:style>
+          <a:lnRef idx="2">
+            <a:schemeClr val="accent6"/>
+          </a:lnRef>
+          <a:fillRef idx="1">
+            <a:schemeClr val="lt1"/>
+          </a:fillRef>
+          <a:effectRef idx="0">
+            <a:schemeClr val="accent6"/>
+          </a:effectRef>
+          <a:fontRef idx="minor">
+            <a:schemeClr val="dk1"/>
+          </a:fontRef>
+        </p:style>
+        <p:txBody>
+          <a:bodyPr rtlCol="0" anchor="ctr"/>
+          <a:lstStyle/>
+          <a:p>
+            <a:pPr algn="ctr"/>
+            <a:endParaRPr lang="es-MX" u="sng"/>
+          </a:p>
+        </p:txBody>
+      </p:sp>
+      <p:sp>
+        <p:nvSpPr>
+          <p:cNvPr id="13" name="Rectángulo 12">
+            <a:extLst>
+              <a:ext uri="{FF2B5EF4-FFF2-40B4-BE49-F238E27FC236}">
+                <a16:creationId xmlns:a16="http://schemas.microsoft.com/office/drawing/2014/main" id="{84C0B5D4-B1C5-B42F-9DDB-8E8DB8022C92}"/>
+              </a:ext>
+            </a:extLst>
+          </p:cNvPr>
+          <p:cNvSpPr/>
+          <p:nvPr/>
+        </p:nvSpPr>
+        <p:spPr>
+          <a:xfrm>
+            <a:off x="9499943" y="2435619"/>
+            <a:ext cx="1800000" cy="1800000"/>
+          </a:xfrm>
+          <a:prstGeom prst="rect">
+            <a:avLst/>
+          </a:prstGeom>
+          <a:ln>
+            <a:noFill/>
+          </a:ln>
+        </p:spPr>
+        <p:style>
+          <a:lnRef idx="2">
+            <a:schemeClr val="accent6"/>
+          </a:lnRef>
+          <a:fillRef idx="1">
+            <a:schemeClr val="lt1"/>
+          </a:fillRef>
+          <a:effectRef idx="0">
+            <a:schemeClr val="accent6"/>
+          </a:effectRef>
+          <a:fontRef idx="minor">
+            <a:schemeClr val="dk1"/>
+          </a:fontRef>
+        </p:style>
+        <p:txBody>
+          <a:bodyPr rtlCol="0" anchor="ctr"/>
+          <a:lstStyle/>
+          <a:p>
+            <a:pPr algn="ctr"/>
+            <a:endParaRPr lang="es-MX" u="sng"/>
+          </a:p>
+        </p:txBody>
+      </p:sp>
+      <p:sp>
+        <p:nvSpPr>
+          <p:cNvPr id="3" name="Rectángulo 2">
+            <a:extLst>
+              <a:ext uri="{FF2B5EF4-FFF2-40B4-BE49-F238E27FC236}">
+                <a16:creationId xmlns:a16="http://schemas.microsoft.com/office/drawing/2014/main" id="{2D20B518-821C-7562-6F2A-00EA2FAF175F}"/>
+              </a:ext>
+            </a:extLst>
+          </p:cNvPr>
+          <p:cNvSpPr/>
+          <p:nvPr/>
+        </p:nvSpPr>
+        <p:spPr>
+          <a:xfrm>
+            <a:off x="148185" y="4738872"/>
+            <a:ext cx="1800000" cy="1800000"/>
+          </a:xfrm>
+          <a:prstGeom prst="rect">
+            <a:avLst/>
+          </a:prstGeom>
+          <a:ln>
+            <a:noFill/>
+          </a:ln>
+        </p:spPr>
+        <p:style>
+          <a:lnRef idx="2">
+            <a:schemeClr val="accent6"/>
+          </a:lnRef>
+          <a:fillRef idx="1">
+            <a:schemeClr val="lt1"/>
+          </a:fillRef>
+          <a:effectRef idx="0">
+            <a:schemeClr val="accent6"/>
+          </a:effectRef>
+          <a:fontRef idx="minor">
+            <a:schemeClr val="dk1"/>
+          </a:fontRef>
+        </p:style>
+        <p:txBody>
+          <a:bodyPr rtlCol="0" anchor="ctr"/>
+          <a:lstStyle/>
+          <a:p>
+            <a:pPr algn="ctr"/>
+            <a:endParaRPr lang="es-MX" u="sng"/>
+          </a:p>
+        </p:txBody>
+      </p:sp>
+      <p:sp>
+        <p:nvSpPr>
+          <p:cNvPr id="15" name="Rectángulo 14">
+            <a:extLst>
+              <a:ext uri="{FF2B5EF4-FFF2-40B4-BE49-F238E27FC236}">
+                <a16:creationId xmlns:a16="http://schemas.microsoft.com/office/drawing/2014/main" id="{62173FD4-8251-D8F4-7060-46618EBFD615}"/>
+              </a:ext>
+            </a:extLst>
+          </p:cNvPr>
+          <p:cNvSpPr/>
+          <p:nvPr/>
+        </p:nvSpPr>
+        <p:spPr>
+          <a:xfrm>
+            <a:off x="2546191" y="4738872"/>
+            <a:ext cx="1800000" cy="1800000"/>
+          </a:xfrm>
+          <a:prstGeom prst="rect">
+            <a:avLst/>
+          </a:prstGeom>
+          <a:ln>
+            <a:noFill/>
+          </a:ln>
+        </p:spPr>
+        <p:style>
+          <a:lnRef idx="2">
+            <a:schemeClr val="accent6"/>
+          </a:lnRef>
+          <a:fillRef idx="1">
+            <a:schemeClr val="lt1"/>
+          </a:fillRef>
+          <a:effectRef idx="0">
+            <a:schemeClr val="accent6"/>
+          </a:effectRef>
+          <a:fontRef idx="minor">
+            <a:schemeClr val="dk1"/>
+          </a:fontRef>
+        </p:style>
+        <p:txBody>
+          <a:bodyPr rtlCol="0" anchor="ctr"/>
+          <a:lstStyle/>
+          <a:p>
+            <a:pPr algn="ctr"/>
+            <a:endParaRPr lang="es-MX" u="sng"/>
+          </a:p>
+        </p:txBody>
+      </p:sp>
+      <p:sp>
+        <p:nvSpPr>
+          <p:cNvPr id="16" name="Rectángulo 15">
+            <a:extLst>
+              <a:ext uri="{FF2B5EF4-FFF2-40B4-BE49-F238E27FC236}">
+                <a16:creationId xmlns:a16="http://schemas.microsoft.com/office/drawing/2014/main" id="{6747704B-4078-2AB9-AD0C-D4BE3E1CF832}"/>
+              </a:ext>
+            </a:extLst>
+          </p:cNvPr>
+          <p:cNvSpPr/>
+          <p:nvPr/>
+        </p:nvSpPr>
+        <p:spPr>
+          <a:xfrm>
+            <a:off x="5184463" y="4738872"/>
+            <a:ext cx="1800000" cy="1800000"/>
+          </a:xfrm>
+          <a:prstGeom prst="rect">
+            <a:avLst/>
+          </a:prstGeom>
+          <a:ln>
+            <a:noFill/>
+          </a:ln>
+        </p:spPr>
+        <p:style>
+          <a:lnRef idx="2">
+            <a:schemeClr val="accent6"/>
+          </a:lnRef>
+          <a:fillRef idx="1">
+            <a:schemeClr val="lt1"/>
+          </a:fillRef>
+          <a:effectRef idx="0">
+            <a:schemeClr val="accent6"/>
+          </a:effectRef>
+          <a:fontRef idx="minor">
+            <a:schemeClr val="dk1"/>
+          </a:fontRef>
+        </p:style>
+        <p:txBody>
+          <a:bodyPr rtlCol="0" anchor="ctr"/>
+          <a:lstStyle/>
+          <a:p>
+            <a:pPr algn="ctr"/>
+            <a:endParaRPr lang="es-MX" u="sng"/>
+          </a:p>
+        </p:txBody>
+      </p:sp>
+      <p:sp>
+        <p:nvSpPr>
+          <p:cNvPr id="17" name="Rectángulo 16">
+            <a:extLst>
+              <a:ext uri="{FF2B5EF4-FFF2-40B4-BE49-F238E27FC236}">
+                <a16:creationId xmlns:a16="http://schemas.microsoft.com/office/drawing/2014/main" id="{A73FAF29-AFCC-1F20-AB55-95C5E924FD5E}"/>
+              </a:ext>
+            </a:extLst>
+          </p:cNvPr>
+          <p:cNvSpPr/>
+          <p:nvPr/>
+        </p:nvSpPr>
+        <p:spPr>
+          <a:xfrm>
+            <a:off x="7342203" y="4738872"/>
+            <a:ext cx="1800000" cy="1800000"/>
+          </a:xfrm>
+          <a:prstGeom prst="rect">
+            <a:avLst/>
+          </a:prstGeom>
+          <a:ln>
+            <a:noFill/>
+          </a:ln>
+        </p:spPr>
+        <p:style>
+          <a:lnRef idx="2">
+            <a:schemeClr val="accent6"/>
+          </a:lnRef>
+          <a:fillRef idx="1">
+            <a:schemeClr val="lt1"/>
+          </a:fillRef>
+          <a:effectRef idx="0">
+            <a:schemeClr val="accent6"/>
+          </a:effectRef>
+          <a:fontRef idx="minor">
+            <a:schemeClr val="dk1"/>
+          </a:fontRef>
+        </p:style>
+        <p:txBody>
+          <a:bodyPr rtlCol="0" anchor="ctr"/>
+          <a:lstStyle/>
+          <a:p>
+            <a:pPr algn="ctr"/>
+            <a:endParaRPr lang="es-MX" u="sng"/>
+          </a:p>
+        </p:txBody>
+      </p:sp>
+      <p:sp>
+        <p:nvSpPr>
+          <p:cNvPr id="18" name="Rectángulo 17">
+            <a:extLst>
+              <a:ext uri="{FF2B5EF4-FFF2-40B4-BE49-F238E27FC236}">
+                <a16:creationId xmlns:a16="http://schemas.microsoft.com/office/drawing/2014/main" id="{E715556D-0D80-8069-E7A3-4A80CB430B5E}"/>
+              </a:ext>
+            </a:extLst>
+          </p:cNvPr>
+          <p:cNvSpPr/>
+          <p:nvPr/>
+        </p:nvSpPr>
+        <p:spPr>
+          <a:xfrm>
+            <a:off x="9499943" y="4738872"/>
+            <a:ext cx="1800000" cy="1800000"/>
+          </a:xfrm>
+          <a:prstGeom prst="rect">
+            <a:avLst/>
+          </a:prstGeom>
+          <a:ln>
+            <a:noFill/>
+          </a:ln>
+        </p:spPr>
+        <p:style>
+          <a:lnRef idx="2">
+            <a:schemeClr val="accent6"/>
+          </a:lnRef>
+          <a:fillRef idx="1">
+            <a:schemeClr val="lt1"/>
+          </a:fillRef>
+          <a:effectRef idx="0">
+            <a:schemeClr val="accent6"/>
+          </a:effectRef>
+          <a:fontRef idx="minor">
+            <a:schemeClr val="dk1"/>
+          </a:fontRef>
+        </p:style>
+        <p:txBody>
+          <a:bodyPr rtlCol="0" anchor="ctr"/>
+          <a:lstStyle/>
+          <a:p>
+            <a:pPr algn="ctr"/>
+            <a:endParaRPr lang="es-MX" u="sng"/>
+          </a:p>
+        </p:txBody>
+      </p:sp>
+      <p:pic>
+        <p:nvPicPr>
+          <p:cNvPr id="24" name="Imagen 23" descr="Tabla&#10;&#10;El contenido generado por IA puede ser incorrecto.">
+            <a:extLst>
+              <a:ext uri="{FF2B5EF4-FFF2-40B4-BE49-F238E27FC236}">
+                <a16:creationId xmlns:a16="http://schemas.microsoft.com/office/drawing/2014/main" id="{0759F032-950D-8836-4689-4750CAC60E74}"/>
+              </a:ext>
+            </a:extLst>
+          </p:cNvPr>
+          <p:cNvPicPr>
+            <a:picLocks noChangeAspect="1"/>
+          </p:cNvPicPr>
+          <p:nvPr/>
+        </p:nvPicPr>
+        <p:blipFill>
+          <a:blip r:embed="rId2">
+            <a:biLevel thresh="75000"/>
+            <a:extLst>
+              <a:ext uri="{28A0092B-C50C-407E-A947-70E740481C1C}">
+                <a14:useLocalDpi xmlns:a14="http://schemas.microsoft.com/office/drawing/2010/main" val="0"/>
+              </a:ext>
+            </a:extLst>
+          </a:blip>
+          <a:srcRect l="37380" t="17383" r="57830" b="78011"/>
+          <a:stretch/>
+        </p:blipFill>
+        <p:spPr>
+          <a:xfrm>
+            <a:off x="276076" y="345823"/>
+            <a:ext cx="1544217" cy="1544178"/>
+          </a:xfrm>
+          <a:prstGeom prst="rect">
+            <a:avLst/>
+          </a:prstGeom>
+        </p:spPr>
+      </p:pic>
+      <p:pic>
+        <p:nvPicPr>
+          <p:cNvPr id="25" name="Imagen 24" descr="Tabla&#10;&#10;El contenido generado por IA puede ser incorrecto.">
+            <a:extLst>
+              <a:ext uri="{FF2B5EF4-FFF2-40B4-BE49-F238E27FC236}">
+                <a16:creationId xmlns:a16="http://schemas.microsoft.com/office/drawing/2014/main" id="{4FF33611-5437-46DE-A551-79960D2A13E5}"/>
+              </a:ext>
+            </a:extLst>
+          </p:cNvPr>
+          <p:cNvPicPr>
+            <a:picLocks noChangeAspect="1"/>
+          </p:cNvPicPr>
+          <p:nvPr/>
+        </p:nvPicPr>
+        <p:blipFill>
+          <a:blip r:embed="rId2">
+            <a:biLevel thresh="75000"/>
+            <a:extLst>
+              <a:ext uri="{28A0092B-C50C-407E-A947-70E740481C1C}">
+                <a14:useLocalDpi xmlns:a14="http://schemas.microsoft.com/office/drawing/2010/main" val="0"/>
+              </a:ext>
+            </a:extLst>
+          </a:blip>
+          <a:srcRect l="37621" t="24347" r="57589" b="71047"/>
+          <a:stretch/>
+        </p:blipFill>
+        <p:spPr>
+          <a:xfrm>
+            <a:off x="2674082" y="345823"/>
+            <a:ext cx="1544217" cy="1544178"/>
+          </a:xfrm>
+          <a:prstGeom prst="rect">
+            <a:avLst/>
+          </a:prstGeom>
+        </p:spPr>
+      </p:pic>
+      <p:pic>
+        <p:nvPicPr>
+          <p:cNvPr id="26" name="Imagen 25" descr="Tabla&#10;&#10;El contenido generado por IA puede ser incorrecto.">
+            <a:extLst>
+              <a:ext uri="{FF2B5EF4-FFF2-40B4-BE49-F238E27FC236}">
+                <a16:creationId xmlns:a16="http://schemas.microsoft.com/office/drawing/2014/main" id="{C91DA199-3915-ADEE-B843-90084E3B2951}"/>
+              </a:ext>
+            </a:extLst>
+          </p:cNvPr>
+          <p:cNvPicPr>
+            <a:picLocks noChangeAspect="1"/>
+          </p:cNvPicPr>
+          <p:nvPr/>
+        </p:nvPicPr>
+        <p:blipFill>
+          <a:blip r:embed="rId2">
+            <a:biLevel thresh="75000"/>
+            <a:extLst>
+              <a:ext uri="{28A0092B-C50C-407E-A947-70E740481C1C}">
+                <a14:useLocalDpi xmlns:a14="http://schemas.microsoft.com/office/drawing/2010/main" val="0"/>
+              </a:ext>
+            </a:extLst>
+          </a:blip>
+          <a:srcRect l="37621" t="31654" r="57589" b="63740"/>
+          <a:stretch/>
+        </p:blipFill>
+        <p:spPr>
+          <a:xfrm>
+            <a:off x="5323891" y="388188"/>
+            <a:ext cx="1544217" cy="1544178"/>
+          </a:xfrm>
+          <a:prstGeom prst="rect">
+            <a:avLst/>
+          </a:prstGeom>
+        </p:spPr>
+      </p:pic>
+      <p:pic>
+        <p:nvPicPr>
+          <p:cNvPr id="27" name="Imagen 26" descr="Tabla&#10;&#10;El contenido generado por IA puede ser incorrecto.">
+            <a:extLst>
+              <a:ext uri="{FF2B5EF4-FFF2-40B4-BE49-F238E27FC236}">
+                <a16:creationId xmlns:a16="http://schemas.microsoft.com/office/drawing/2014/main" id="{D5DBF1C6-7A2C-117B-D5C3-1895E384A12D}"/>
+              </a:ext>
+            </a:extLst>
+          </p:cNvPr>
+          <p:cNvPicPr>
+            <a:picLocks noChangeAspect="1"/>
+          </p:cNvPicPr>
+          <p:nvPr/>
+        </p:nvPicPr>
+        <p:blipFill>
+          <a:blip r:embed="rId2">
+            <a:biLevel thresh="75000"/>
+            <a:extLst>
+              <a:ext uri="{28A0092B-C50C-407E-A947-70E740481C1C}">
+                <a14:useLocalDpi xmlns:a14="http://schemas.microsoft.com/office/drawing/2010/main" val="0"/>
+              </a:ext>
+            </a:extLst>
+          </a:blip>
+          <a:srcRect l="37440" t="38905" r="57770" b="56489"/>
+          <a:stretch/>
+        </p:blipFill>
+        <p:spPr>
+          <a:xfrm>
+            <a:off x="7470094" y="345823"/>
+            <a:ext cx="1544217" cy="1544178"/>
+          </a:xfrm>
+          <a:prstGeom prst="rect">
+            <a:avLst/>
+          </a:prstGeom>
+        </p:spPr>
+      </p:pic>
+      <p:pic>
+        <p:nvPicPr>
+          <p:cNvPr id="28" name="Imagen 27" descr="Tabla&#10;&#10;El contenido generado por IA puede ser incorrecto.">
+            <a:extLst>
+              <a:ext uri="{FF2B5EF4-FFF2-40B4-BE49-F238E27FC236}">
+                <a16:creationId xmlns:a16="http://schemas.microsoft.com/office/drawing/2014/main" id="{E0469291-57BF-C8F4-0413-2025BE42B620}"/>
+              </a:ext>
+            </a:extLst>
+          </p:cNvPr>
+          <p:cNvPicPr>
+            <a:picLocks noChangeAspect="1"/>
+          </p:cNvPicPr>
+          <p:nvPr/>
+        </p:nvPicPr>
+        <p:blipFill>
+          <a:blip r:embed="rId2">
+            <a:biLevel thresh="75000"/>
+            <a:extLst>
+              <a:ext uri="{28A0092B-C50C-407E-A947-70E740481C1C}">
+                <a14:useLocalDpi xmlns:a14="http://schemas.microsoft.com/office/drawing/2010/main" val="0"/>
+              </a:ext>
+            </a:extLst>
+          </a:blip>
+          <a:srcRect l="37199" t="46457" r="58011" b="48937"/>
+          <a:stretch/>
+        </p:blipFill>
+        <p:spPr>
+          <a:xfrm>
+            <a:off x="9645809" y="345823"/>
+            <a:ext cx="1544217" cy="1544178"/>
+          </a:xfrm>
+          <a:prstGeom prst="rect">
+            <a:avLst/>
+          </a:prstGeom>
+        </p:spPr>
+      </p:pic>
+      <p:pic>
+        <p:nvPicPr>
+          <p:cNvPr id="29" name="Imagen 28" descr="Tabla&#10;&#10;El contenido generado por IA puede ser incorrecto.">
+            <a:extLst>
+              <a:ext uri="{FF2B5EF4-FFF2-40B4-BE49-F238E27FC236}">
+                <a16:creationId xmlns:a16="http://schemas.microsoft.com/office/drawing/2014/main" id="{5B4FAAFB-01B8-36C8-A11A-3065D263501A}"/>
+              </a:ext>
+            </a:extLst>
+          </p:cNvPr>
+          <p:cNvPicPr>
+            <a:picLocks noChangeAspect="1"/>
+          </p:cNvPicPr>
+          <p:nvPr/>
+        </p:nvPicPr>
+        <p:blipFill>
+          <a:blip r:embed="rId2">
+            <a:biLevel thresh="75000"/>
+            <a:extLst>
+              <a:ext uri="{28A0092B-C50C-407E-A947-70E740481C1C}">
+                <a14:useLocalDpi xmlns:a14="http://schemas.microsoft.com/office/drawing/2010/main" val="0"/>
+              </a:ext>
+            </a:extLst>
+          </a:blip>
+          <a:srcRect l="37375" t="53493" r="57835" b="41901"/>
+          <a:stretch/>
+        </p:blipFill>
+        <p:spPr>
+          <a:xfrm>
+            <a:off x="276076" y="2521165"/>
+            <a:ext cx="1544217" cy="1544178"/>
+          </a:xfrm>
+          <a:prstGeom prst="rect">
+            <a:avLst/>
+          </a:prstGeom>
+        </p:spPr>
+      </p:pic>
+      <p:pic>
+        <p:nvPicPr>
+          <p:cNvPr id="30" name="Imagen 29" descr="Tabla&#10;&#10;El contenido generado por IA puede ser incorrecto.">
+            <a:extLst>
+              <a:ext uri="{FF2B5EF4-FFF2-40B4-BE49-F238E27FC236}">
+                <a16:creationId xmlns:a16="http://schemas.microsoft.com/office/drawing/2014/main" id="{2CE24D77-4E29-B429-6361-F0DE11A912FC}"/>
+              </a:ext>
+            </a:extLst>
+          </p:cNvPr>
+          <p:cNvPicPr>
+            <a:picLocks noChangeAspect="1"/>
+          </p:cNvPicPr>
+          <p:nvPr/>
+        </p:nvPicPr>
+        <p:blipFill>
+          <a:blip r:embed="rId2">
+            <a:biLevel thresh="75000"/>
+            <a:extLst>
+              <a:ext uri="{28A0092B-C50C-407E-A947-70E740481C1C}">
+                <a14:useLocalDpi xmlns:a14="http://schemas.microsoft.com/office/drawing/2010/main" val="0"/>
+              </a:ext>
+            </a:extLst>
+          </a:blip>
+          <a:srcRect l="36991" t="61153" r="58219" b="34241"/>
+          <a:stretch/>
+        </p:blipFill>
+        <p:spPr>
+          <a:xfrm>
+            <a:off x="2674082" y="2521165"/>
+            <a:ext cx="1544217" cy="1544178"/>
+          </a:xfrm>
+          <a:prstGeom prst="rect">
+            <a:avLst/>
+          </a:prstGeom>
+        </p:spPr>
+      </p:pic>
+      <p:pic>
+        <p:nvPicPr>
+          <p:cNvPr id="31" name="Imagen 30" descr="Tabla&#10;&#10;El contenido generado por IA puede ser incorrecto.">
+            <a:extLst>
+              <a:ext uri="{FF2B5EF4-FFF2-40B4-BE49-F238E27FC236}">
+                <a16:creationId xmlns:a16="http://schemas.microsoft.com/office/drawing/2014/main" id="{65089824-9BFA-DBD7-8952-2704A2331D76}"/>
+              </a:ext>
+            </a:extLst>
+          </p:cNvPr>
+          <p:cNvPicPr>
+            <a:picLocks noChangeAspect="1"/>
+          </p:cNvPicPr>
+          <p:nvPr/>
+        </p:nvPicPr>
+        <p:blipFill>
+          <a:blip r:embed="rId2">
+            <a:biLevel thresh="75000"/>
+            <a:extLst>
+              <a:ext uri="{28A0092B-C50C-407E-A947-70E740481C1C}">
+                <a14:useLocalDpi xmlns:a14="http://schemas.microsoft.com/office/drawing/2010/main" val="0"/>
+              </a:ext>
+            </a:extLst>
+          </a:blip>
+          <a:srcRect l="37486" t="68334" r="57724" b="27060"/>
+          <a:stretch/>
+        </p:blipFill>
+        <p:spPr>
+          <a:xfrm>
+            <a:off x="5323891" y="2563530"/>
+            <a:ext cx="1544217" cy="1544178"/>
+          </a:xfrm>
+          <a:prstGeom prst="rect">
+            <a:avLst/>
+          </a:prstGeom>
+        </p:spPr>
+      </p:pic>
+      <p:pic>
+        <p:nvPicPr>
+          <p:cNvPr id="32" name="Imagen 31" descr="Tabla&#10;&#10;El contenido generado por IA puede ser incorrecto.">
+            <a:extLst>
+              <a:ext uri="{FF2B5EF4-FFF2-40B4-BE49-F238E27FC236}">
+                <a16:creationId xmlns:a16="http://schemas.microsoft.com/office/drawing/2014/main" id="{16F4C972-AB18-DA97-F286-69AFE9712BAF}"/>
+              </a:ext>
+            </a:extLst>
+          </p:cNvPr>
+          <p:cNvPicPr>
+            <a:picLocks noChangeAspect="1"/>
+          </p:cNvPicPr>
+          <p:nvPr/>
+        </p:nvPicPr>
+        <p:blipFill>
+          <a:blip r:embed="rId2">
+            <a:biLevel thresh="75000"/>
+            <a:extLst>
+              <a:ext uri="{28A0092B-C50C-407E-A947-70E740481C1C}">
+                <a14:useLocalDpi xmlns:a14="http://schemas.microsoft.com/office/drawing/2010/main" val="0"/>
+              </a:ext>
+            </a:extLst>
+          </a:blip>
+          <a:srcRect l="37351" t="75646" r="57859" b="19748"/>
+          <a:stretch/>
+        </p:blipFill>
+        <p:spPr>
+          <a:xfrm>
+            <a:off x="7470094" y="2521165"/>
+            <a:ext cx="1544217" cy="1544178"/>
+          </a:xfrm>
+          <a:prstGeom prst="rect">
+            <a:avLst/>
+          </a:prstGeom>
+        </p:spPr>
+      </p:pic>
+      <p:pic>
+        <p:nvPicPr>
+          <p:cNvPr id="33" name="Imagen 32" descr="Tabla&#10;&#10;El contenido generado por IA puede ser incorrecto.">
+            <a:extLst>
+              <a:ext uri="{FF2B5EF4-FFF2-40B4-BE49-F238E27FC236}">
+                <a16:creationId xmlns:a16="http://schemas.microsoft.com/office/drawing/2014/main" id="{C5B00869-DD0A-B040-6ED4-798986B234B5}"/>
+              </a:ext>
+            </a:extLst>
+          </p:cNvPr>
+          <p:cNvPicPr>
+            <a:picLocks noChangeAspect="1"/>
+          </p:cNvPicPr>
+          <p:nvPr/>
+        </p:nvPicPr>
+        <p:blipFill>
+          <a:blip r:embed="rId2">
+            <a:biLevel thresh="75000"/>
+            <a:extLst>
+              <a:ext uri="{28A0092B-C50C-407E-A947-70E740481C1C}">
+                <a14:useLocalDpi xmlns:a14="http://schemas.microsoft.com/office/drawing/2010/main" val="0"/>
+              </a:ext>
+            </a:extLst>
+          </a:blip>
+          <a:srcRect l="37419" t="83167" r="57791" b="12227"/>
+          <a:stretch/>
+        </p:blipFill>
+        <p:spPr>
+          <a:xfrm>
+            <a:off x="9645809" y="2521165"/>
+            <a:ext cx="1544217" cy="1544178"/>
+          </a:xfrm>
+          <a:prstGeom prst="rect">
+            <a:avLst/>
+          </a:prstGeom>
+        </p:spPr>
+      </p:pic>
+      <p:pic>
+        <p:nvPicPr>
+          <p:cNvPr id="34" name="Imagen 33" descr="Tabla&#10;&#10;El contenido generado por IA puede ser incorrecto.">
+            <a:extLst>
+              <a:ext uri="{FF2B5EF4-FFF2-40B4-BE49-F238E27FC236}">
+                <a16:creationId xmlns:a16="http://schemas.microsoft.com/office/drawing/2014/main" id="{CDAAA5F7-BB4F-E8D0-CE86-3F4C39B3B31B}"/>
+              </a:ext>
+            </a:extLst>
+          </p:cNvPr>
+          <p:cNvPicPr>
+            <a:picLocks noChangeAspect="1"/>
+          </p:cNvPicPr>
+          <p:nvPr/>
+        </p:nvPicPr>
+        <p:blipFill>
+          <a:blip r:embed="rId2">
+            <a:biLevel thresh="75000"/>
+            <a:extLst>
+              <a:ext uri="{28A0092B-C50C-407E-A947-70E740481C1C}">
+                <a14:useLocalDpi xmlns:a14="http://schemas.microsoft.com/office/drawing/2010/main" val="0"/>
+              </a:ext>
+            </a:extLst>
+          </a:blip>
+          <a:srcRect l="37375" t="90294" r="57835" b="5100"/>
+          <a:stretch/>
+        </p:blipFill>
+        <p:spPr>
+          <a:xfrm>
+            <a:off x="276076" y="4840089"/>
+            <a:ext cx="1544217" cy="1544178"/>
+          </a:xfrm>
+          <a:prstGeom prst="rect">
+            <a:avLst/>
+          </a:prstGeom>
+        </p:spPr>
+      </p:pic>
+      <p:pic>
+        <p:nvPicPr>
+          <p:cNvPr id="35" name="Imagen 34" descr="Tabla&#10;&#10;El contenido generado por IA puede ser incorrecto.">
+            <a:extLst>
+              <a:ext uri="{FF2B5EF4-FFF2-40B4-BE49-F238E27FC236}">
+                <a16:creationId xmlns:a16="http://schemas.microsoft.com/office/drawing/2014/main" id="{8794476E-B9E0-7C9C-4C6F-EEE87D9F2F81}"/>
+              </a:ext>
+            </a:extLst>
+          </p:cNvPr>
+          <p:cNvPicPr>
+            <a:picLocks noChangeAspect="1"/>
+          </p:cNvPicPr>
+          <p:nvPr/>
+        </p:nvPicPr>
+        <p:blipFill>
+          <a:blip r:embed="rId2">
+            <a:biLevel thresh="75000"/>
+            <a:extLst>
+              <a:ext uri="{28A0092B-C50C-407E-A947-70E740481C1C}">
+                <a14:useLocalDpi xmlns:a14="http://schemas.microsoft.com/office/drawing/2010/main" val="0"/>
+              </a:ext>
+            </a:extLst>
+          </a:blip>
+          <a:srcRect l="37380" t="17383" r="57830" b="78011"/>
+          <a:stretch/>
+        </p:blipFill>
+        <p:spPr>
+          <a:xfrm>
+            <a:off x="2674082" y="4840089"/>
+            <a:ext cx="1544217" cy="1544178"/>
+          </a:xfrm>
+          <a:prstGeom prst="rect">
+            <a:avLst/>
+          </a:prstGeom>
+        </p:spPr>
+      </p:pic>
+      <p:pic>
+        <p:nvPicPr>
+          <p:cNvPr id="36" name="Imagen 35" descr="Tabla&#10;&#10;El contenido generado por IA puede ser incorrecto.">
+            <a:extLst>
+              <a:ext uri="{FF2B5EF4-FFF2-40B4-BE49-F238E27FC236}">
+                <a16:creationId xmlns:a16="http://schemas.microsoft.com/office/drawing/2014/main" id="{E92372CE-1E9E-618B-BAAE-9ABD318FF8DC}"/>
+              </a:ext>
+            </a:extLst>
+          </p:cNvPr>
+          <p:cNvPicPr>
+            <a:picLocks noChangeAspect="1"/>
+          </p:cNvPicPr>
+          <p:nvPr/>
+        </p:nvPicPr>
+        <p:blipFill>
+          <a:blip r:embed="rId2">
+            <a:biLevel thresh="75000"/>
+            <a:extLst>
+              <a:ext uri="{28A0092B-C50C-407E-A947-70E740481C1C}">
+                <a14:useLocalDpi xmlns:a14="http://schemas.microsoft.com/office/drawing/2010/main" val="0"/>
+              </a:ext>
+            </a:extLst>
+          </a:blip>
+          <a:srcRect l="37380" t="17383" r="57830" b="78011"/>
+          <a:stretch/>
+        </p:blipFill>
+        <p:spPr>
+          <a:xfrm>
+            <a:off x="5323891" y="4882454"/>
+            <a:ext cx="1544217" cy="1544178"/>
+          </a:xfrm>
+          <a:prstGeom prst="rect">
+            <a:avLst/>
+          </a:prstGeom>
+        </p:spPr>
+      </p:pic>
+      <p:pic>
+        <p:nvPicPr>
+          <p:cNvPr id="37" name="Imagen 36" descr="Tabla&#10;&#10;El contenido generado por IA puede ser incorrecto.">
+            <a:extLst>
+              <a:ext uri="{FF2B5EF4-FFF2-40B4-BE49-F238E27FC236}">
+                <a16:creationId xmlns:a16="http://schemas.microsoft.com/office/drawing/2014/main" id="{6E19F569-9792-A9CE-19F5-F84EB925F5D7}"/>
+              </a:ext>
+            </a:extLst>
+          </p:cNvPr>
+          <p:cNvPicPr>
+            <a:picLocks noChangeAspect="1"/>
+          </p:cNvPicPr>
+          <p:nvPr/>
+        </p:nvPicPr>
+        <p:blipFill>
+          <a:blip r:embed="rId2">
+            <a:biLevel thresh="75000"/>
+            <a:extLst>
+              <a:ext uri="{28A0092B-C50C-407E-A947-70E740481C1C}">
+                <a14:useLocalDpi xmlns:a14="http://schemas.microsoft.com/office/drawing/2010/main" val="0"/>
+              </a:ext>
+            </a:extLst>
+          </a:blip>
+          <a:srcRect l="37380" t="17383" r="57830" b="78011"/>
+          <a:stretch/>
+        </p:blipFill>
+        <p:spPr>
+          <a:xfrm>
+            <a:off x="7470094" y="4840089"/>
+            <a:ext cx="1544217" cy="1544178"/>
+          </a:xfrm>
+          <a:prstGeom prst="rect">
+            <a:avLst/>
+          </a:prstGeom>
+        </p:spPr>
+      </p:pic>
+      <p:pic>
+        <p:nvPicPr>
+          <p:cNvPr id="38" name="Imagen 37" descr="Tabla&#10;&#10;El contenido generado por IA puede ser incorrecto.">
+            <a:extLst>
+              <a:ext uri="{FF2B5EF4-FFF2-40B4-BE49-F238E27FC236}">
+                <a16:creationId xmlns:a16="http://schemas.microsoft.com/office/drawing/2014/main" id="{18ED23B0-47B0-C16D-FAE2-EEB0F5EFDEA3}"/>
+              </a:ext>
+            </a:extLst>
+          </p:cNvPr>
+          <p:cNvPicPr>
+            <a:picLocks noChangeAspect="1"/>
+          </p:cNvPicPr>
+          <p:nvPr/>
+        </p:nvPicPr>
+        <p:blipFill>
+          <a:blip r:embed="rId2">
+            <a:biLevel thresh="75000"/>
+            <a:extLst>
+              <a:ext uri="{28A0092B-C50C-407E-A947-70E740481C1C}">
+                <a14:useLocalDpi xmlns:a14="http://schemas.microsoft.com/office/drawing/2010/main" val="0"/>
+              </a:ext>
+            </a:extLst>
+          </a:blip>
+          <a:srcRect l="37380" t="17383" r="57830" b="78011"/>
+          <a:stretch/>
+        </p:blipFill>
+        <p:spPr>
+          <a:xfrm>
+            <a:off x="9645809" y="4840089"/>
+            <a:ext cx="1544217" cy="1544178"/>
+          </a:xfrm>
+          <a:prstGeom prst="rect">
+            <a:avLst/>
+          </a:prstGeom>
+        </p:spPr>
+      </p:pic>
+    </p:spTree>
+    <p:extLst>
+      <p:ext uri="{BB962C8B-B14F-4D97-AF65-F5344CB8AC3E}">
+        <p14:creationId xmlns:p14="http://schemas.microsoft.com/office/powerpoint/2010/main" val="2763957024"/>
+      </p:ext>
+    </p:extLst>
+  </p:cSld>
+  <p:clrMapOvr>
+    <a:masterClrMapping/>
+  </p:clrMapOvr>
+</p:sld>
+</file>
+
+<file path=ppt/slides/slide5.xml><?xml version="1.0" encoding="utf-8"?>
+<p:sld xmlns:a="http://schemas.openxmlformats.org/drawingml/2006/main" xmlns:r="http://schemas.openxmlformats.org/officeDocument/2006/relationships" xmlns:p="http://schemas.openxmlformats.org/presentationml/2006/main">
+  <p:cSld>
+    <p:bg>
+      <p:bgPr>
+        <a:solidFill>
+          <a:schemeClr val="accent2">
+            <a:lumMod val="40000"/>
+            <a:lumOff val="60000"/>
+          </a:schemeClr>
+        </a:solidFill>
+        <a:effectLst/>
+      </p:bgPr>
+    </p:bg>
+    <p:spTree>
+      <p:nvGrpSpPr>
+        <p:cNvPr id="1" name="">
+          <a:extLst>
+            <a:ext uri="{FF2B5EF4-FFF2-40B4-BE49-F238E27FC236}">
+              <a16:creationId xmlns:a16="http://schemas.microsoft.com/office/drawing/2014/main" id="{66112AF5-E873-F47B-1084-F1B6C0D21D7D}"/>
+            </a:ext>
+          </a:extLst>
+        </p:cNvPr>
+        <p:cNvGrpSpPr/>
+        <p:nvPr/>
+      </p:nvGrpSpPr>
+      <p:grpSpPr>
+        <a:xfrm>
+          <a:off x="0" y="0"/>
+          <a:ext cx="0" cy="0"/>
+          <a:chOff x="0" y="0"/>
+          <a:chExt cx="0" cy="0"/>
+        </a:xfrm>
+      </p:grpSpPr>
+    </p:spTree>
+    <p:extLst>
+      <p:ext uri="{BB962C8B-B14F-4D97-AF65-F5344CB8AC3E}">
+        <p14:creationId xmlns:p14="http://schemas.microsoft.com/office/powerpoint/2010/main" val="724043392"/>
+      </p:ext>
+    </p:extLst>
+  </p:cSld>
+  <p:clrMapOvr>
+    <a:masterClrMapping/>
+  </p:clrMapOvr>
+</p:sld>
+</file>
+
+<file path=ppt/slides/slide6.xml><?xml version="1.0" encoding="utf-8"?>
+<p:sld xmlns:a="http://schemas.openxmlformats.org/drawingml/2006/main" xmlns:r="http://schemas.openxmlformats.org/officeDocument/2006/relationships" xmlns:p="http://schemas.openxmlformats.org/presentationml/2006/main">
+  <p:cSld>
+    <p:bg>
+      <p:bgPr>
+        <a:solidFill>
+          <a:schemeClr val="accent2">
+            <a:lumMod val="40000"/>
+            <a:lumOff val="60000"/>
+          </a:schemeClr>
+        </a:solidFill>
+        <a:effectLst/>
+      </p:bgPr>
+    </p:bg>
+    <p:spTree>
+      <p:nvGrpSpPr>
+        <p:cNvPr id="1" name="">
+          <a:extLst>
+            <a:ext uri="{FF2B5EF4-FFF2-40B4-BE49-F238E27FC236}">
+              <a16:creationId xmlns:a16="http://schemas.microsoft.com/office/drawing/2014/main" id="{AFC69FD7-1E63-9F22-59B4-4A9CF664AB9D}"/>
+            </a:ext>
+          </a:extLst>
+        </p:cNvPr>
+        <p:cNvGrpSpPr/>
+        <p:nvPr/>
+      </p:nvGrpSpPr>
+      <p:grpSpPr>
+        <a:xfrm>
+          <a:off x="0" y="0"/>
+          <a:ext cx="0" cy="0"/>
+          <a:chOff x="0" y="0"/>
+          <a:chExt cx="0" cy="0"/>
+        </a:xfrm>
+      </p:grpSpPr>
+      <p:sp>
+        <p:nvSpPr>
+          <p:cNvPr id="4" name="Rectángulo 3">
+            <a:extLst>
+              <a:ext uri="{FF2B5EF4-FFF2-40B4-BE49-F238E27FC236}">
+                <a16:creationId xmlns:a16="http://schemas.microsoft.com/office/drawing/2014/main" id="{7D2C86A6-B197-B03F-3267-33CC3189EE89}"/>
+              </a:ext>
+            </a:extLst>
+          </p:cNvPr>
+          <p:cNvSpPr/>
+          <p:nvPr/>
+        </p:nvSpPr>
+        <p:spPr>
+          <a:xfrm>
+            <a:off x="148185" y="217912"/>
+            <a:ext cx="1800000" cy="1800000"/>
+          </a:xfrm>
+          <a:prstGeom prst="rect">
+            <a:avLst/>
+          </a:prstGeom>
+          <a:ln>
+            <a:noFill/>
+          </a:ln>
+        </p:spPr>
+        <p:style>
+          <a:lnRef idx="2">
+            <a:schemeClr val="accent6"/>
+          </a:lnRef>
+          <a:fillRef idx="1">
+            <a:schemeClr val="lt1"/>
+          </a:fillRef>
+          <a:effectRef idx="0">
+            <a:schemeClr val="accent6"/>
+          </a:effectRef>
+          <a:fontRef idx="minor">
+            <a:schemeClr val="dk1"/>
+          </a:fontRef>
+        </p:style>
+        <p:txBody>
+          <a:bodyPr rtlCol="0" anchor="ctr"/>
+          <a:lstStyle/>
+          <a:p>
+            <a:pPr algn="ctr"/>
+            <a:endParaRPr lang="es-MX"/>
+          </a:p>
+        </p:txBody>
+      </p:sp>
+      <p:sp>
+        <p:nvSpPr>
+          <p:cNvPr id="5" name="Rectángulo 4">
+            <a:extLst>
+              <a:ext uri="{FF2B5EF4-FFF2-40B4-BE49-F238E27FC236}">
+                <a16:creationId xmlns:a16="http://schemas.microsoft.com/office/drawing/2014/main" id="{4AAAC422-AE7F-1F9F-31F3-43ADDCF3CB04}"/>
+              </a:ext>
+            </a:extLst>
+          </p:cNvPr>
+          <p:cNvSpPr/>
+          <p:nvPr/>
+        </p:nvSpPr>
+        <p:spPr>
+          <a:xfrm>
+            <a:off x="2546191" y="217912"/>
+            <a:ext cx="1800000" cy="1800000"/>
+          </a:xfrm>
+          <a:prstGeom prst="rect">
+            <a:avLst/>
+          </a:prstGeom>
+          <a:ln>
+            <a:noFill/>
+          </a:ln>
+        </p:spPr>
+        <p:style>
+          <a:lnRef idx="2">
+            <a:schemeClr val="accent6"/>
+          </a:lnRef>
+          <a:fillRef idx="1">
+            <a:schemeClr val="lt1"/>
+          </a:fillRef>
+          <a:effectRef idx="0">
+            <a:schemeClr val="accent6"/>
+          </a:effectRef>
+          <a:fontRef idx="minor">
+            <a:schemeClr val="dk1"/>
+          </a:fontRef>
+        </p:style>
+        <p:txBody>
+          <a:bodyPr rtlCol="0" anchor="ctr"/>
+          <a:lstStyle/>
+          <a:p>
+            <a:pPr algn="ctr"/>
+            <a:endParaRPr lang="es-MX"/>
+          </a:p>
+        </p:txBody>
+      </p:sp>
+      <p:sp>
+        <p:nvSpPr>
+          <p:cNvPr id="6" name="Rectángulo 5">
+            <a:extLst>
+              <a:ext uri="{FF2B5EF4-FFF2-40B4-BE49-F238E27FC236}">
+                <a16:creationId xmlns:a16="http://schemas.microsoft.com/office/drawing/2014/main" id="{D134A66D-4850-B936-7CDF-F7416036B6A7}"/>
+              </a:ext>
+            </a:extLst>
+          </p:cNvPr>
+          <p:cNvSpPr/>
+          <p:nvPr/>
+        </p:nvSpPr>
+        <p:spPr>
+          <a:xfrm>
+            <a:off x="5184463" y="217912"/>
+            <a:ext cx="1800000" cy="1800000"/>
+          </a:xfrm>
+          <a:prstGeom prst="rect">
+            <a:avLst/>
+          </a:prstGeom>
+          <a:ln>
+            <a:noFill/>
+          </a:ln>
+        </p:spPr>
+        <p:style>
+          <a:lnRef idx="2">
+            <a:schemeClr val="accent6"/>
+          </a:lnRef>
+          <a:fillRef idx="1">
+            <a:schemeClr val="lt1"/>
+          </a:fillRef>
+          <a:effectRef idx="0">
+            <a:schemeClr val="accent6"/>
+          </a:effectRef>
+          <a:fontRef idx="minor">
+            <a:schemeClr val="dk1"/>
+          </a:fontRef>
+        </p:style>
+        <p:txBody>
+          <a:bodyPr rtlCol="0" anchor="ctr"/>
+          <a:lstStyle/>
+          <a:p>
+            <a:pPr algn="ctr"/>
+            <a:endParaRPr lang="es-MX"/>
+          </a:p>
+        </p:txBody>
+      </p:sp>
+      <p:sp>
+        <p:nvSpPr>
+          <p:cNvPr id="7" name="Rectángulo 6">
+            <a:extLst>
+              <a:ext uri="{FF2B5EF4-FFF2-40B4-BE49-F238E27FC236}">
+                <a16:creationId xmlns:a16="http://schemas.microsoft.com/office/drawing/2014/main" id="{9361E2ED-8AA2-1BFB-24E3-548EAC05F7E6}"/>
+              </a:ext>
+            </a:extLst>
+          </p:cNvPr>
+          <p:cNvSpPr/>
+          <p:nvPr/>
+        </p:nvSpPr>
+        <p:spPr>
+          <a:xfrm>
+            <a:off x="7342203" y="217912"/>
+            <a:ext cx="1800000" cy="1800000"/>
+          </a:xfrm>
+          <a:prstGeom prst="rect">
+            <a:avLst/>
+          </a:prstGeom>
+          <a:ln>
+            <a:noFill/>
+          </a:ln>
+        </p:spPr>
+        <p:style>
+          <a:lnRef idx="2">
+            <a:schemeClr val="accent6"/>
+          </a:lnRef>
+          <a:fillRef idx="1">
+            <a:schemeClr val="lt1"/>
+          </a:fillRef>
+          <a:effectRef idx="0">
+            <a:schemeClr val="accent6"/>
+          </a:effectRef>
+          <a:fontRef idx="minor">
+            <a:schemeClr val="dk1"/>
+          </a:fontRef>
+        </p:style>
+        <p:txBody>
+          <a:bodyPr rtlCol="0" anchor="ctr"/>
+          <a:lstStyle/>
+          <a:p>
+            <a:pPr algn="ctr"/>
+            <a:endParaRPr lang="es-MX"/>
+          </a:p>
+        </p:txBody>
+      </p:sp>
+      <p:sp>
+        <p:nvSpPr>
+          <p:cNvPr id="8" name="Rectángulo 7">
+            <a:extLst>
+              <a:ext uri="{FF2B5EF4-FFF2-40B4-BE49-F238E27FC236}">
+                <a16:creationId xmlns:a16="http://schemas.microsoft.com/office/drawing/2014/main" id="{4B5B0FCF-E7B4-8AC9-894F-E355DDB48B0D}"/>
+              </a:ext>
+            </a:extLst>
+          </p:cNvPr>
+          <p:cNvSpPr/>
+          <p:nvPr/>
+        </p:nvSpPr>
+        <p:spPr>
+          <a:xfrm>
+            <a:off x="9499943" y="217912"/>
+            <a:ext cx="1800000" cy="1800000"/>
+          </a:xfrm>
+          <a:prstGeom prst="rect">
+            <a:avLst/>
+          </a:prstGeom>
+          <a:ln>
+            <a:noFill/>
+          </a:ln>
+        </p:spPr>
+        <p:style>
+          <a:lnRef idx="2">
+            <a:schemeClr val="accent6"/>
+          </a:lnRef>
+          <a:fillRef idx="1">
+            <a:schemeClr val="lt1"/>
+          </a:fillRef>
+          <a:effectRef idx="0">
+            <a:schemeClr val="accent6"/>
+          </a:effectRef>
+          <a:fontRef idx="minor">
+            <a:schemeClr val="dk1"/>
+          </a:fontRef>
+        </p:style>
+        <p:txBody>
+          <a:bodyPr rtlCol="0" anchor="ctr"/>
+          <a:lstStyle/>
+          <a:p>
+            <a:pPr algn="ctr"/>
+            <a:endParaRPr lang="es-MX"/>
+          </a:p>
+        </p:txBody>
+      </p:sp>
+      <p:sp>
+        <p:nvSpPr>
+          <p:cNvPr id="9" name="Rectángulo 8">
+            <a:extLst>
+              <a:ext uri="{FF2B5EF4-FFF2-40B4-BE49-F238E27FC236}">
+                <a16:creationId xmlns:a16="http://schemas.microsoft.com/office/drawing/2014/main" id="{C96D0A9B-CF71-5408-9DE4-1099E92B7D27}"/>
+              </a:ext>
+            </a:extLst>
+          </p:cNvPr>
+          <p:cNvSpPr/>
+          <p:nvPr/>
+        </p:nvSpPr>
+        <p:spPr>
+          <a:xfrm>
+            <a:off x="249785" y="3608812"/>
+            <a:ext cx="1800000" cy="1800000"/>
+          </a:xfrm>
+          <a:prstGeom prst="rect">
+            <a:avLst/>
+          </a:prstGeom>
+          <a:ln>
+            <a:noFill/>
+          </a:ln>
+        </p:spPr>
+        <p:style>
+          <a:lnRef idx="2">
+            <a:schemeClr val="accent6"/>
+          </a:lnRef>
+          <a:fillRef idx="1">
+            <a:schemeClr val="lt1"/>
+          </a:fillRef>
+          <a:effectRef idx="0">
+            <a:schemeClr val="accent6"/>
+          </a:effectRef>
+          <a:fontRef idx="minor">
+            <a:schemeClr val="dk1"/>
+          </a:fontRef>
+        </p:style>
+        <p:txBody>
+          <a:bodyPr rtlCol="0" anchor="ctr"/>
+          <a:lstStyle/>
+          <a:p>
+            <a:pPr algn="ctr"/>
+            <a:endParaRPr lang="es-MX"/>
+          </a:p>
+        </p:txBody>
+      </p:sp>
+      <p:sp>
+        <p:nvSpPr>
+          <p:cNvPr id="10" name="Rectángulo 9">
+            <a:extLst>
+              <a:ext uri="{FF2B5EF4-FFF2-40B4-BE49-F238E27FC236}">
+                <a16:creationId xmlns:a16="http://schemas.microsoft.com/office/drawing/2014/main" id="{01832094-5654-9338-6CF3-7611707B25C5}"/>
+              </a:ext>
+            </a:extLst>
+          </p:cNvPr>
+          <p:cNvSpPr/>
+          <p:nvPr/>
+        </p:nvSpPr>
+        <p:spPr>
+          <a:xfrm>
+            <a:off x="2647791" y="3608812"/>
+            <a:ext cx="1800000" cy="1800000"/>
+          </a:xfrm>
+          <a:prstGeom prst="rect">
+            <a:avLst/>
+          </a:prstGeom>
+          <a:ln>
+            <a:noFill/>
+          </a:ln>
+        </p:spPr>
+        <p:style>
+          <a:lnRef idx="2">
+            <a:schemeClr val="accent6"/>
+          </a:lnRef>
+          <a:fillRef idx="1">
+            <a:schemeClr val="lt1"/>
+          </a:fillRef>
+          <a:effectRef idx="0">
+            <a:schemeClr val="accent6"/>
+          </a:effectRef>
+          <a:fontRef idx="minor">
+            <a:schemeClr val="dk1"/>
+          </a:fontRef>
+        </p:style>
+        <p:txBody>
+          <a:bodyPr rtlCol="0" anchor="ctr"/>
+          <a:lstStyle/>
+          <a:p>
+            <a:pPr algn="ctr"/>
+            <a:endParaRPr lang="es-MX"/>
+          </a:p>
+        </p:txBody>
+      </p:sp>
+      <p:sp>
+        <p:nvSpPr>
+          <p:cNvPr id="11" name="Rectángulo 10">
+            <a:extLst>
+              <a:ext uri="{FF2B5EF4-FFF2-40B4-BE49-F238E27FC236}">
+                <a16:creationId xmlns:a16="http://schemas.microsoft.com/office/drawing/2014/main" id="{71C111F5-8E63-4218-5424-5393C407F725}"/>
+              </a:ext>
+            </a:extLst>
+          </p:cNvPr>
+          <p:cNvSpPr/>
+          <p:nvPr/>
+        </p:nvSpPr>
+        <p:spPr>
+          <a:xfrm>
+            <a:off x="5286063" y="3608812"/>
+            <a:ext cx="1800000" cy="1800000"/>
+          </a:xfrm>
+          <a:prstGeom prst="rect">
+            <a:avLst/>
+          </a:prstGeom>
+          <a:ln>
+            <a:noFill/>
+          </a:ln>
+        </p:spPr>
+        <p:style>
+          <a:lnRef idx="2">
+            <a:schemeClr val="accent6"/>
+          </a:lnRef>
+          <a:fillRef idx="1">
+            <a:schemeClr val="lt1"/>
+          </a:fillRef>
+          <a:effectRef idx="0">
+            <a:schemeClr val="accent6"/>
+          </a:effectRef>
+          <a:fontRef idx="minor">
+            <a:schemeClr val="dk1"/>
+          </a:fontRef>
+        </p:style>
+        <p:txBody>
+          <a:bodyPr rtlCol="0" anchor="ctr"/>
+          <a:lstStyle/>
+          <a:p>
+            <a:pPr algn="ctr"/>
+            <a:endParaRPr lang="es-MX"/>
+          </a:p>
+        </p:txBody>
+      </p:sp>
+      <p:sp>
+        <p:nvSpPr>
+          <p:cNvPr id="12" name="Rectángulo 11">
+            <a:extLst>
+              <a:ext uri="{FF2B5EF4-FFF2-40B4-BE49-F238E27FC236}">
+                <a16:creationId xmlns:a16="http://schemas.microsoft.com/office/drawing/2014/main" id="{7F65A136-352F-DFB1-C796-F965968041F2}"/>
+              </a:ext>
+            </a:extLst>
+          </p:cNvPr>
+          <p:cNvSpPr/>
+          <p:nvPr/>
+        </p:nvSpPr>
+        <p:spPr>
+          <a:xfrm>
+            <a:off x="7443803" y="3608812"/>
+            <a:ext cx="1800000" cy="1800000"/>
+          </a:xfrm>
+          <a:prstGeom prst="rect">
+            <a:avLst/>
+          </a:prstGeom>
+          <a:ln>
+            <a:noFill/>
+          </a:ln>
+        </p:spPr>
+        <p:style>
+          <a:lnRef idx="2">
+            <a:schemeClr val="accent6"/>
+          </a:lnRef>
+          <a:fillRef idx="1">
+            <a:schemeClr val="lt1"/>
+          </a:fillRef>
+          <a:effectRef idx="0">
+            <a:schemeClr val="accent6"/>
+          </a:effectRef>
+          <a:fontRef idx="minor">
+            <a:schemeClr val="dk1"/>
+          </a:fontRef>
+        </p:style>
+        <p:txBody>
+          <a:bodyPr rtlCol="0" anchor="ctr"/>
+          <a:lstStyle/>
+          <a:p>
+            <a:pPr algn="ctr"/>
+            <a:endParaRPr lang="es-MX"/>
+          </a:p>
+        </p:txBody>
+      </p:sp>
+      <p:sp>
+        <p:nvSpPr>
+          <p:cNvPr id="13" name="Rectángulo 12">
+            <a:extLst>
+              <a:ext uri="{FF2B5EF4-FFF2-40B4-BE49-F238E27FC236}">
+                <a16:creationId xmlns:a16="http://schemas.microsoft.com/office/drawing/2014/main" id="{5B19DBC5-08B4-73DA-5508-46375EB0E096}"/>
+              </a:ext>
+            </a:extLst>
+          </p:cNvPr>
+          <p:cNvSpPr/>
+          <p:nvPr/>
+        </p:nvSpPr>
+        <p:spPr>
+          <a:xfrm>
+            <a:off x="9601543" y="3608812"/>
+            <a:ext cx="1800000" cy="1800000"/>
+          </a:xfrm>
+          <a:prstGeom prst="rect">
+            <a:avLst/>
+          </a:prstGeom>
+          <a:ln>
+            <a:noFill/>
+          </a:ln>
+        </p:spPr>
+        <p:style>
+          <a:lnRef idx="2">
+            <a:schemeClr val="accent6"/>
+          </a:lnRef>
+          <a:fillRef idx="1">
+            <a:schemeClr val="lt1"/>
+          </a:fillRef>
+          <a:effectRef idx="0">
+            <a:schemeClr val="accent6"/>
+          </a:effectRef>
+          <a:fontRef idx="minor">
+            <a:schemeClr val="dk1"/>
+          </a:fontRef>
+        </p:style>
+        <p:txBody>
+          <a:bodyPr rtlCol="0" anchor="ctr"/>
+          <a:lstStyle/>
+          <a:p>
+            <a:pPr algn="ctr"/>
+            <a:endParaRPr lang="es-MX"/>
+          </a:p>
+        </p:txBody>
+      </p:sp>
+      <mc:AlternateContent xmlns:mc="http://schemas.openxmlformats.org/markup-compatibility/2006">
+        <mc:Choice xmlns:p14="http://schemas.microsoft.com/office/powerpoint/2010/main" Requires="p14">
+          <p:contentPart p14:bwMode="auto" r:id="rId2">
+            <p14:nvContentPartPr>
+              <p14:cNvPr id="2" name="Entrada de lápiz 1">
+                <a:extLst>
+                  <a:ext uri="{FF2B5EF4-FFF2-40B4-BE49-F238E27FC236}">
+                    <a16:creationId xmlns:a16="http://schemas.microsoft.com/office/drawing/2014/main" id="{9C88379B-377B-F201-91F4-B03DCE38D90D}"/>
+                  </a:ext>
+                </a:extLst>
+              </p14:cNvPr>
+              <p14:cNvContentPartPr/>
+              <p14:nvPr/>
+            </p14:nvContentPartPr>
+            <p14:xfrm>
+              <a:off x="437160" y="507360"/>
+              <a:ext cx="922320" cy="1323360"/>
+            </p14:xfrm>
+          </p:contentPart>
+        </mc:Choice>
+        <mc:Fallback>
+          <p:pic>
+            <p:nvPicPr>
+              <p:cNvPr id="2" name="Entrada de lápiz 1">
+                <a:extLst>
+                  <a:ext uri="{FF2B5EF4-FFF2-40B4-BE49-F238E27FC236}">
+                    <a16:creationId xmlns:a16="http://schemas.microsoft.com/office/drawing/2014/main" id="{9C88379B-377B-F201-91F4-B03DCE38D90D}"/>
+                  </a:ext>
+                </a:extLst>
+              </p:cNvPr>
+              <p:cNvPicPr/>
+              <p:nvPr/>
+            </p:nvPicPr>
+            <p:blipFill>
+              <a:blip r:embed="rId3"/>
+              <a:stretch>
+                <a:fillRect/>
+              </a:stretch>
+            </p:blipFill>
+            <p:spPr>
+              <a:xfrm>
+                <a:off x="374520" y="444720"/>
+                <a:ext cx="1047960" cy="1449000"/>
+              </a:xfrm>
+              <a:prstGeom prst="rect">
+                <a:avLst/>
+              </a:prstGeom>
+            </p:spPr>
+          </p:pic>
+        </mc:Fallback>
+      </mc:AlternateContent>
+      <mc:AlternateContent xmlns:mc="http://schemas.openxmlformats.org/markup-compatibility/2006">
+        <mc:Choice xmlns:p14="http://schemas.microsoft.com/office/powerpoint/2010/main" Requires="p14">
+          <p:contentPart p14:bwMode="auto" r:id="rId4">
+            <p14:nvContentPartPr>
+              <p14:cNvPr id="3" name="Entrada de lápiz 2">
+                <a:extLst>
+                  <a:ext uri="{FF2B5EF4-FFF2-40B4-BE49-F238E27FC236}">
+                    <a16:creationId xmlns:a16="http://schemas.microsoft.com/office/drawing/2014/main" id="{C3406258-5A52-4FF1-4638-06321B3558EE}"/>
+                  </a:ext>
+                </a:extLst>
+              </p14:cNvPr>
+              <p14:cNvContentPartPr/>
+              <p14:nvPr/>
+            </p14:nvContentPartPr>
+            <p14:xfrm>
+              <a:off x="2856720" y="467400"/>
+              <a:ext cx="1082520" cy="1031400"/>
+            </p14:xfrm>
+          </p:contentPart>
+        </mc:Choice>
+        <mc:Fallback>
+          <p:pic>
+            <p:nvPicPr>
+              <p:cNvPr id="3" name="Entrada de lápiz 2">
+                <a:extLst>
+                  <a:ext uri="{FF2B5EF4-FFF2-40B4-BE49-F238E27FC236}">
+                    <a16:creationId xmlns:a16="http://schemas.microsoft.com/office/drawing/2014/main" id="{C3406258-5A52-4FF1-4638-06321B3558EE}"/>
+                  </a:ext>
+                </a:extLst>
+              </p:cNvPr>
+              <p:cNvPicPr/>
+              <p:nvPr/>
+            </p:nvPicPr>
+            <p:blipFill>
+              <a:blip r:embed="rId5"/>
+              <a:stretch>
+                <a:fillRect/>
+              </a:stretch>
+            </p:blipFill>
+            <p:spPr>
+              <a:xfrm>
+                <a:off x="2793720" y="404400"/>
+                <a:ext cx="1208160" cy="1157040"/>
+              </a:xfrm>
+              <a:prstGeom prst="rect">
+                <a:avLst/>
+              </a:prstGeom>
+            </p:spPr>
+          </p:pic>
+        </mc:Fallback>
+      </mc:AlternateContent>
+      <p:grpSp>
+        <p:nvGrpSpPr>
+          <p:cNvPr id="17" name="Grupo 16">
+            <a:extLst>
+              <a:ext uri="{FF2B5EF4-FFF2-40B4-BE49-F238E27FC236}">
+                <a16:creationId xmlns:a16="http://schemas.microsoft.com/office/drawing/2014/main" id="{10BDA5DF-B001-AA80-ED9C-6F9E70629268}"/>
+              </a:ext>
+            </a:extLst>
+          </p:cNvPr>
+          <p:cNvGrpSpPr/>
+          <p:nvPr/>
+        </p:nvGrpSpPr>
+        <p:grpSpPr>
+          <a:xfrm>
+            <a:off x="5942640" y="479280"/>
+            <a:ext cx="159840" cy="1181520"/>
+            <a:chOff x="5942640" y="479280"/>
+            <a:chExt cx="159840" cy="1181520"/>
+          </a:xfrm>
+        </p:grpSpPr>
+        <mc:AlternateContent xmlns:mc="http://schemas.openxmlformats.org/markup-compatibility/2006">
+          <mc:Choice xmlns:p14="http://schemas.microsoft.com/office/powerpoint/2010/main" Requires="p14">
+            <p:contentPart p14:bwMode="auto" r:id="rId6">
+              <p14:nvContentPartPr>
+                <p14:cNvPr id="15" name="Entrada de lápiz 14">
+                  <a:extLst>
+                    <a:ext uri="{FF2B5EF4-FFF2-40B4-BE49-F238E27FC236}">
+                      <a16:creationId xmlns:a16="http://schemas.microsoft.com/office/drawing/2014/main" id="{DD8CEE1E-D5CA-7A39-0080-223622086F1D}"/>
+                    </a:ext>
+                  </a:extLst>
+                </p14:cNvPr>
+                <p14:cNvContentPartPr/>
+                <p14:nvPr/>
+              </p14:nvContentPartPr>
+              <p14:xfrm>
+                <a:off x="5942640" y="799680"/>
+                <a:ext cx="58320" cy="861120"/>
+              </p14:xfrm>
+            </p:contentPart>
+          </mc:Choice>
+          <mc:Fallback>
+            <p:pic>
+              <p:nvPicPr>
+                <p:cNvPr id="15" name="Entrada de lápiz 14">
+                  <a:extLst>
+                    <a:ext uri="{FF2B5EF4-FFF2-40B4-BE49-F238E27FC236}">
+                      <a16:creationId xmlns:a16="http://schemas.microsoft.com/office/drawing/2014/main" id="{DD8CEE1E-D5CA-7A39-0080-223622086F1D}"/>
+                    </a:ext>
+                  </a:extLst>
+                </p:cNvPr>
+                <p:cNvPicPr/>
+                <p:nvPr/>
+              </p:nvPicPr>
+              <p:blipFill>
+                <a:blip r:embed="rId7"/>
+                <a:stretch>
+                  <a:fillRect/>
+                </a:stretch>
+              </p:blipFill>
+              <p:spPr>
+                <a:xfrm>
+                  <a:off x="5879640" y="736680"/>
+                  <a:ext cx="183960" cy="986760"/>
+                </a:xfrm>
+                <a:prstGeom prst="rect">
+                  <a:avLst/>
+                </a:prstGeom>
+              </p:spPr>
+            </p:pic>
+          </mc:Fallback>
+        </mc:AlternateContent>
+        <mc:AlternateContent xmlns:mc="http://schemas.openxmlformats.org/markup-compatibility/2006">
+          <mc:Choice xmlns:p14="http://schemas.microsoft.com/office/powerpoint/2010/main" Requires="p14">
+            <p:contentPart p14:bwMode="auto" r:id="rId8">
+              <p14:nvContentPartPr>
+                <p14:cNvPr id="16" name="Entrada de lápiz 15">
+                  <a:extLst>
+                    <a:ext uri="{FF2B5EF4-FFF2-40B4-BE49-F238E27FC236}">
+                      <a16:creationId xmlns:a16="http://schemas.microsoft.com/office/drawing/2014/main" id="{CFD9663D-DC01-AF4C-BA94-2B859B253769}"/>
+                    </a:ext>
+                  </a:extLst>
+                </p14:cNvPr>
+                <p14:cNvContentPartPr/>
+                <p14:nvPr/>
+              </p14:nvContentPartPr>
+              <p14:xfrm>
+                <a:off x="6016080" y="479280"/>
+                <a:ext cx="86400" cy="53280"/>
+              </p14:xfrm>
+            </p:contentPart>
+          </mc:Choice>
+          <mc:Fallback>
+            <p:pic>
+              <p:nvPicPr>
+                <p:cNvPr id="16" name="Entrada de lápiz 15">
+                  <a:extLst>
+                    <a:ext uri="{FF2B5EF4-FFF2-40B4-BE49-F238E27FC236}">
+                      <a16:creationId xmlns:a16="http://schemas.microsoft.com/office/drawing/2014/main" id="{CFD9663D-DC01-AF4C-BA94-2B859B253769}"/>
+                    </a:ext>
+                  </a:extLst>
+                </p:cNvPr>
+                <p:cNvPicPr/>
+                <p:nvPr/>
+              </p:nvPicPr>
+              <p:blipFill>
+                <a:blip r:embed="rId9"/>
+                <a:stretch>
+                  <a:fillRect/>
+                </a:stretch>
+              </p:blipFill>
+              <p:spPr>
+                <a:xfrm>
+                  <a:off x="5953440" y="416640"/>
+                  <a:ext cx="212040" cy="178920"/>
+                </a:xfrm>
+                <a:prstGeom prst="rect">
+                  <a:avLst/>
+                </a:prstGeom>
+              </p:spPr>
+            </p:pic>
+          </mc:Fallback>
+        </mc:AlternateContent>
+      </p:grpSp>
+      <mc:AlternateContent xmlns:mc="http://schemas.openxmlformats.org/markup-compatibility/2006">
+        <mc:Choice xmlns:p14="http://schemas.microsoft.com/office/powerpoint/2010/main" Requires="p14">
+          <p:contentPart p14:bwMode="auto" r:id="rId10">
+            <p14:nvContentPartPr>
+              <p14:cNvPr id="18" name="Entrada de lápiz 17">
+                <a:extLst>
+                  <a:ext uri="{FF2B5EF4-FFF2-40B4-BE49-F238E27FC236}">
+                    <a16:creationId xmlns:a16="http://schemas.microsoft.com/office/drawing/2014/main" id="{40A4CEE5-6C06-3856-B594-96B5EE3A6D66}"/>
+                  </a:ext>
+                </a:extLst>
+              </p14:cNvPr>
+              <p14:cNvContentPartPr/>
+              <p14:nvPr/>
+            </p14:nvContentPartPr>
+            <p14:xfrm>
+              <a:off x="7833720" y="767280"/>
+              <a:ext cx="1006200" cy="922680"/>
+            </p14:xfrm>
+          </p:contentPart>
+        </mc:Choice>
+        <mc:Fallback>
+          <p:pic>
+            <p:nvPicPr>
+              <p:cNvPr id="18" name="Entrada de lápiz 17">
+                <a:extLst>
+                  <a:ext uri="{FF2B5EF4-FFF2-40B4-BE49-F238E27FC236}">
+                    <a16:creationId xmlns:a16="http://schemas.microsoft.com/office/drawing/2014/main" id="{40A4CEE5-6C06-3856-B594-96B5EE3A6D66}"/>
+                  </a:ext>
+                </a:extLst>
+              </p:cNvPr>
+              <p:cNvPicPr/>
+              <p:nvPr/>
+            </p:nvPicPr>
+            <p:blipFill>
+              <a:blip r:embed="rId11"/>
+              <a:stretch>
+                <a:fillRect/>
+              </a:stretch>
+            </p:blipFill>
+            <p:spPr>
+              <a:xfrm>
+                <a:off x="7770720" y="704640"/>
+                <a:ext cx="1131840" cy="1048320"/>
+              </a:xfrm>
+              <a:prstGeom prst="rect">
+                <a:avLst/>
+              </a:prstGeom>
+            </p:spPr>
+          </p:pic>
+        </mc:Fallback>
+      </mc:AlternateContent>
+      <mc:AlternateContent xmlns:mc="http://schemas.openxmlformats.org/markup-compatibility/2006">
+        <mc:Choice xmlns:p14="http://schemas.microsoft.com/office/powerpoint/2010/main" Requires="p14">
+          <p:contentPart p14:bwMode="auto" r:id="rId12">
+            <p14:nvContentPartPr>
+              <p14:cNvPr id="23" name="Entrada de lápiz 22">
+                <a:extLst>
+                  <a:ext uri="{FF2B5EF4-FFF2-40B4-BE49-F238E27FC236}">
+                    <a16:creationId xmlns:a16="http://schemas.microsoft.com/office/drawing/2014/main" id="{86B7083A-E8C3-317B-DDF1-9D3F3418F9F6}"/>
+                  </a:ext>
+                </a:extLst>
+              </p14:cNvPr>
+              <p14:cNvContentPartPr/>
+              <p14:nvPr/>
+            </p14:nvContentPartPr>
+            <p14:xfrm>
+              <a:off x="10083720" y="833520"/>
+              <a:ext cx="858600" cy="862920"/>
+            </p14:xfrm>
+          </p:contentPart>
+        </mc:Choice>
+        <mc:Fallback>
+          <p:pic>
+            <p:nvPicPr>
+              <p:cNvPr id="23" name="Entrada de lápiz 22">
+                <a:extLst>
+                  <a:ext uri="{FF2B5EF4-FFF2-40B4-BE49-F238E27FC236}">
+                    <a16:creationId xmlns:a16="http://schemas.microsoft.com/office/drawing/2014/main" id="{86B7083A-E8C3-317B-DDF1-9D3F3418F9F6}"/>
+                  </a:ext>
+                </a:extLst>
+              </p:cNvPr>
+              <p:cNvPicPr/>
+              <p:nvPr/>
+            </p:nvPicPr>
+            <p:blipFill>
+              <a:blip r:embed="rId13"/>
+              <a:stretch>
+                <a:fillRect/>
+              </a:stretch>
+            </p:blipFill>
+            <p:spPr>
+              <a:xfrm>
+                <a:off x="10020720" y="770520"/>
+                <a:ext cx="984240" cy="988560"/>
+              </a:xfrm>
+              <a:prstGeom prst="rect">
+                <a:avLst/>
+              </a:prstGeom>
+            </p:spPr>
+          </p:pic>
+        </mc:Fallback>
+      </mc:AlternateContent>
+      <mc:AlternateContent xmlns:mc="http://schemas.openxmlformats.org/markup-compatibility/2006">
+        <mc:Choice xmlns:p14="http://schemas.microsoft.com/office/powerpoint/2010/main" Requires="p14">
+          <p:contentPart p14:bwMode="auto" r:id="rId14">
+            <p14:nvContentPartPr>
+              <p14:cNvPr id="25" name="Entrada de lápiz 24">
+                <a:extLst>
+                  <a:ext uri="{FF2B5EF4-FFF2-40B4-BE49-F238E27FC236}">
+                    <a16:creationId xmlns:a16="http://schemas.microsoft.com/office/drawing/2014/main" id="{3F8C54A5-6E3A-F6C9-F8AC-1C358CBBEF88}"/>
+                  </a:ext>
+                </a:extLst>
+              </p14:cNvPr>
+              <p14:cNvContentPartPr/>
+              <p14:nvPr/>
+            </p14:nvContentPartPr>
+            <p14:xfrm>
+              <a:off x="875501" y="3965021"/>
+              <a:ext cx="183240" cy="250560"/>
+            </p14:xfrm>
+          </p:contentPart>
+        </mc:Choice>
+        <mc:Fallback>
+          <p:pic>
+            <p:nvPicPr>
+              <p:cNvPr id="25" name="Entrada de lápiz 24">
+                <a:extLst>
+                  <a:ext uri="{FF2B5EF4-FFF2-40B4-BE49-F238E27FC236}">
+                    <a16:creationId xmlns:a16="http://schemas.microsoft.com/office/drawing/2014/main" id="{3F8C54A5-6E3A-F6C9-F8AC-1C358CBBEF88}"/>
+                  </a:ext>
+                </a:extLst>
+              </p:cNvPr>
+              <p:cNvPicPr/>
+              <p:nvPr/>
+            </p:nvPicPr>
+            <p:blipFill>
+              <a:blip r:embed="rId15"/>
+              <a:stretch>
+                <a:fillRect/>
+              </a:stretch>
+            </p:blipFill>
+            <p:spPr>
+              <a:xfrm>
+                <a:off x="812501" y="3902021"/>
+                <a:ext cx="308880" cy="376200"/>
+              </a:xfrm>
+              <a:prstGeom prst="rect">
+                <a:avLst/>
+              </a:prstGeom>
+            </p:spPr>
+          </p:pic>
+        </mc:Fallback>
+      </mc:AlternateContent>
+      <mc:AlternateContent xmlns:mc="http://schemas.openxmlformats.org/markup-compatibility/2006">
+        <mc:Choice xmlns:p14="http://schemas.microsoft.com/office/powerpoint/2010/main" Requires="p14">
+          <p:contentPart p14:bwMode="auto" r:id="rId16">
+            <p14:nvContentPartPr>
+              <p14:cNvPr id="26" name="Entrada de lápiz 25">
+                <a:extLst>
+                  <a:ext uri="{FF2B5EF4-FFF2-40B4-BE49-F238E27FC236}">
+                    <a16:creationId xmlns:a16="http://schemas.microsoft.com/office/drawing/2014/main" id="{30BE63EF-B65B-C3DB-BAFD-01A586A7FC1F}"/>
+                  </a:ext>
+                </a:extLst>
+              </p14:cNvPr>
+              <p14:cNvContentPartPr/>
+              <p14:nvPr/>
+            </p14:nvContentPartPr>
+            <p14:xfrm>
+              <a:off x="999701" y="3965021"/>
+              <a:ext cx="58680" cy="1097640"/>
+            </p14:xfrm>
+          </p:contentPart>
+        </mc:Choice>
+        <mc:Fallback>
+          <p:pic>
+            <p:nvPicPr>
+              <p:cNvPr id="26" name="Entrada de lápiz 25">
+                <a:extLst>
+                  <a:ext uri="{FF2B5EF4-FFF2-40B4-BE49-F238E27FC236}">
+                    <a16:creationId xmlns:a16="http://schemas.microsoft.com/office/drawing/2014/main" id="{30BE63EF-B65B-C3DB-BAFD-01A586A7FC1F}"/>
+                  </a:ext>
+                </a:extLst>
+              </p:cNvPr>
+              <p:cNvPicPr/>
+              <p:nvPr/>
+            </p:nvPicPr>
+            <p:blipFill>
+              <a:blip r:embed="rId17"/>
+              <a:stretch>
+                <a:fillRect/>
+              </a:stretch>
+            </p:blipFill>
+            <p:spPr>
+              <a:xfrm>
+                <a:off x="937061" y="3902021"/>
+                <a:ext cx="184320" cy="1223280"/>
+              </a:xfrm>
+              <a:prstGeom prst="rect">
+                <a:avLst/>
+              </a:prstGeom>
+            </p:spPr>
+          </p:pic>
+        </mc:Fallback>
+      </mc:AlternateContent>
+      <mc:AlternateContent xmlns:mc="http://schemas.openxmlformats.org/markup-compatibility/2006">
+        <mc:Choice xmlns:p14="http://schemas.microsoft.com/office/powerpoint/2010/main" Requires="p14">
+          <p:contentPart p14:bwMode="auto" r:id="rId18">
+            <p14:nvContentPartPr>
+              <p14:cNvPr id="27" name="Entrada de lápiz 26">
+                <a:extLst>
+                  <a:ext uri="{FF2B5EF4-FFF2-40B4-BE49-F238E27FC236}">
+                    <a16:creationId xmlns:a16="http://schemas.microsoft.com/office/drawing/2014/main" id="{43FFD928-DA68-E961-A0DF-7356FA57B462}"/>
+                  </a:ext>
+                </a:extLst>
+              </p14:cNvPr>
+              <p14:cNvContentPartPr/>
+              <p14:nvPr/>
+            </p14:nvContentPartPr>
+            <p14:xfrm>
+              <a:off x="3061421" y="3935861"/>
+              <a:ext cx="798120" cy="1272960"/>
+            </p14:xfrm>
+          </p:contentPart>
+        </mc:Choice>
+        <mc:Fallback>
+          <p:pic>
+            <p:nvPicPr>
+              <p:cNvPr id="27" name="Entrada de lápiz 26">
+                <a:extLst>
+                  <a:ext uri="{FF2B5EF4-FFF2-40B4-BE49-F238E27FC236}">
+                    <a16:creationId xmlns:a16="http://schemas.microsoft.com/office/drawing/2014/main" id="{43FFD928-DA68-E961-A0DF-7356FA57B462}"/>
+                  </a:ext>
+                </a:extLst>
+              </p:cNvPr>
+              <p:cNvPicPr/>
+              <p:nvPr/>
+            </p:nvPicPr>
+            <p:blipFill>
+              <a:blip r:embed="rId19"/>
+              <a:stretch>
+                <a:fillRect/>
+              </a:stretch>
+            </p:blipFill>
+            <p:spPr>
+              <a:xfrm>
+                <a:off x="2998781" y="3872861"/>
+                <a:ext cx="923760" cy="1398600"/>
+              </a:xfrm>
+              <a:prstGeom prst="rect">
+                <a:avLst/>
+              </a:prstGeom>
+            </p:spPr>
+          </p:pic>
+        </mc:Fallback>
+      </mc:AlternateContent>
+      <mc:AlternateContent xmlns:mc="http://schemas.openxmlformats.org/markup-compatibility/2006">
+        <mc:Choice xmlns:p14="http://schemas.microsoft.com/office/powerpoint/2010/main" Requires="p14">
+          <p:contentPart p14:bwMode="auto" r:id="rId20">
+            <p14:nvContentPartPr>
+              <p14:cNvPr id="28" name="Entrada de lápiz 27">
+                <a:extLst>
+                  <a:ext uri="{FF2B5EF4-FFF2-40B4-BE49-F238E27FC236}">
+                    <a16:creationId xmlns:a16="http://schemas.microsoft.com/office/drawing/2014/main" id="{66317472-DB43-09A0-96CF-734291408A6D}"/>
+                  </a:ext>
+                </a:extLst>
+              </p14:cNvPr>
+              <p14:cNvContentPartPr/>
+              <p14:nvPr/>
+            </p14:nvContentPartPr>
+            <p14:xfrm>
+              <a:off x="5560901" y="3993821"/>
+              <a:ext cx="1035360" cy="1185120"/>
+            </p14:xfrm>
+          </p:contentPart>
+        </mc:Choice>
+        <mc:Fallback>
+          <p:pic>
+            <p:nvPicPr>
+              <p:cNvPr id="28" name="Entrada de lápiz 27">
+                <a:extLst>
+                  <a:ext uri="{FF2B5EF4-FFF2-40B4-BE49-F238E27FC236}">
+                    <a16:creationId xmlns:a16="http://schemas.microsoft.com/office/drawing/2014/main" id="{66317472-DB43-09A0-96CF-734291408A6D}"/>
+                  </a:ext>
+                </a:extLst>
+              </p:cNvPr>
+              <p:cNvPicPr/>
+              <p:nvPr/>
+            </p:nvPicPr>
+            <p:blipFill>
+              <a:blip r:embed="rId21"/>
+              <a:stretch>
+                <a:fillRect/>
+              </a:stretch>
+            </p:blipFill>
+            <p:spPr>
+              <a:xfrm>
+                <a:off x="5497901" y="3931181"/>
+                <a:ext cx="1161000" cy="1310760"/>
+              </a:xfrm>
+              <a:prstGeom prst="rect">
+                <a:avLst/>
+              </a:prstGeom>
+            </p:spPr>
+          </p:pic>
+        </mc:Fallback>
+      </mc:AlternateContent>
+      <mc:AlternateContent xmlns:mc="http://schemas.openxmlformats.org/markup-compatibility/2006">
+        <mc:Choice xmlns:p14="http://schemas.microsoft.com/office/powerpoint/2010/main" Requires="p14">
+          <p:contentPart p14:bwMode="auto" r:id="rId22">
+            <p14:nvContentPartPr>
+              <p14:cNvPr id="29" name="Entrada de lápiz 28">
+                <a:extLst>
+                  <a:ext uri="{FF2B5EF4-FFF2-40B4-BE49-F238E27FC236}">
+                    <a16:creationId xmlns:a16="http://schemas.microsoft.com/office/drawing/2014/main" id="{F80643E4-E6BA-B34D-1BC5-2FF44AC107D2}"/>
+                  </a:ext>
+                </a:extLst>
+              </p14:cNvPr>
+              <p14:cNvContentPartPr/>
+              <p14:nvPr/>
+            </p14:nvContentPartPr>
+            <p14:xfrm>
+              <a:off x="8040221" y="4080581"/>
+              <a:ext cx="641880" cy="1089360"/>
+            </p14:xfrm>
+          </p:contentPart>
+        </mc:Choice>
+        <mc:Fallback>
+          <p:pic>
+            <p:nvPicPr>
+              <p:cNvPr id="29" name="Entrada de lápiz 28">
+                <a:extLst>
+                  <a:ext uri="{FF2B5EF4-FFF2-40B4-BE49-F238E27FC236}">
+                    <a16:creationId xmlns:a16="http://schemas.microsoft.com/office/drawing/2014/main" id="{F80643E4-E6BA-B34D-1BC5-2FF44AC107D2}"/>
+                  </a:ext>
+                </a:extLst>
+              </p:cNvPr>
+              <p:cNvPicPr/>
+              <p:nvPr/>
+            </p:nvPicPr>
+            <p:blipFill>
+              <a:blip r:embed="rId23"/>
+              <a:stretch>
+                <a:fillRect/>
+              </a:stretch>
+            </p:blipFill>
+            <p:spPr>
+              <a:xfrm>
+                <a:off x="7977581" y="4017941"/>
+                <a:ext cx="767520" cy="1215000"/>
+              </a:xfrm>
+              <a:prstGeom prst="rect">
+                <a:avLst/>
+              </a:prstGeom>
+            </p:spPr>
+          </p:pic>
+        </mc:Fallback>
+      </mc:AlternateContent>
+      <mc:AlternateContent xmlns:mc="http://schemas.openxmlformats.org/markup-compatibility/2006">
+        <mc:Choice xmlns:p14="http://schemas.microsoft.com/office/powerpoint/2010/main" Requires="p14">
+          <p:contentPart p14:bwMode="auto" r:id="rId24">
+            <p14:nvContentPartPr>
+              <p14:cNvPr id="30" name="Entrada de lápiz 29">
+                <a:extLst>
+                  <a:ext uri="{FF2B5EF4-FFF2-40B4-BE49-F238E27FC236}">
+                    <a16:creationId xmlns:a16="http://schemas.microsoft.com/office/drawing/2014/main" id="{A3D6AF30-2509-736C-9EAA-90DE4A6D6AB6}"/>
+                  </a:ext>
+                </a:extLst>
+              </p14:cNvPr>
+              <p14:cNvContentPartPr/>
+              <p14:nvPr/>
+            </p14:nvContentPartPr>
+            <p14:xfrm>
+              <a:off x="9990701" y="4128461"/>
+              <a:ext cx="755640" cy="1075680"/>
+            </p14:xfrm>
+          </p:contentPart>
+        </mc:Choice>
+        <mc:Fallback>
+          <p:pic>
+            <p:nvPicPr>
+              <p:cNvPr id="30" name="Entrada de lápiz 29">
+                <a:extLst>
+                  <a:ext uri="{FF2B5EF4-FFF2-40B4-BE49-F238E27FC236}">
+                    <a16:creationId xmlns:a16="http://schemas.microsoft.com/office/drawing/2014/main" id="{A3D6AF30-2509-736C-9EAA-90DE4A6D6AB6}"/>
+                  </a:ext>
+                </a:extLst>
+              </p:cNvPr>
+              <p:cNvPicPr/>
+              <p:nvPr/>
+            </p:nvPicPr>
+            <p:blipFill>
+              <a:blip r:embed="rId25"/>
+              <a:stretch>
+                <a:fillRect/>
+              </a:stretch>
+            </p:blipFill>
+            <p:spPr>
+              <a:xfrm>
+                <a:off x="9927701" y="4065821"/>
+                <a:ext cx="881280" cy="1201320"/>
+              </a:xfrm>
+              <a:prstGeom prst="rect">
+                <a:avLst/>
+              </a:prstGeom>
+            </p:spPr>
+          </p:pic>
+        </mc:Fallback>
+      </mc:AlternateContent>
+    </p:spTree>
+    <p:extLst>
+      <p:ext uri="{BB962C8B-B14F-4D97-AF65-F5344CB8AC3E}">
+        <p14:creationId xmlns:p14="http://schemas.microsoft.com/office/powerpoint/2010/main" val="1912747891"/>
+      </p:ext>
+    </p:extLst>
+  </p:cSld>
+  <p:clrMapOvr>
+    <a:masterClrMapping/>
+  </p:clrMapOvr>
+</p:sld>
+</file>
+
 <file path=ppt/theme/theme1.xml><?xml version="1.0" encoding="utf-8"?>
 <a:theme xmlns:a="http://schemas.openxmlformats.org/drawingml/2006/main" name="Tema de Office">
   <a:themeElements>

</xml_diff>